<commit_message>
增加 - c4 code
</commit_message>
<xml_diff>
--- a/learn_cpp/docs/C++语言培训.pptx
+++ b/learn_cpp/docs/C++语言培训.pptx
@@ -42,24 +42,32 @@
     <p:sldId id="286" r:id="rId36"/>
     <p:sldId id="287" r:id="rId37"/>
     <p:sldId id="259" r:id="rId38"/>
-    <p:sldId id="260" r:id="rId39"/>
-    <p:sldId id="288" r:id="rId40"/>
-    <p:sldId id="289" r:id="rId41"/>
-    <p:sldId id="290" r:id="rId42"/>
-    <p:sldId id="291" r:id="rId43"/>
-    <p:sldId id="292" r:id="rId44"/>
-    <p:sldId id="293" r:id="rId45"/>
-    <p:sldId id="294" r:id="rId46"/>
-    <p:sldId id="295" r:id="rId47"/>
-    <p:sldId id="296" r:id="rId48"/>
-    <p:sldId id="261" r:id="rId49"/>
-    <p:sldId id="262" r:id="rId50"/>
-    <p:sldId id="263" r:id="rId51"/>
-    <p:sldId id="264" r:id="rId52"/>
-    <p:sldId id="265" r:id="rId53"/>
-    <p:sldId id="266" r:id="rId54"/>
-    <p:sldId id="267" r:id="rId55"/>
-    <p:sldId id="268" r:id="rId56"/>
+    <p:sldId id="316" r:id="rId39"/>
+    <p:sldId id="312" r:id="rId40"/>
+    <p:sldId id="319" r:id="rId41"/>
+    <p:sldId id="313" r:id="rId42"/>
+    <p:sldId id="314" r:id="rId43"/>
+    <p:sldId id="317" r:id="rId44"/>
+    <p:sldId id="318" r:id="rId45"/>
+    <p:sldId id="315" r:id="rId46"/>
+    <p:sldId id="260" r:id="rId47"/>
+    <p:sldId id="288" r:id="rId48"/>
+    <p:sldId id="289" r:id="rId49"/>
+    <p:sldId id="290" r:id="rId50"/>
+    <p:sldId id="291" r:id="rId51"/>
+    <p:sldId id="292" r:id="rId52"/>
+    <p:sldId id="293" r:id="rId53"/>
+    <p:sldId id="294" r:id="rId54"/>
+    <p:sldId id="295" r:id="rId55"/>
+    <p:sldId id="296" r:id="rId56"/>
+    <p:sldId id="261" r:id="rId57"/>
+    <p:sldId id="262" r:id="rId58"/>
+    <p:sldId id="263" r:id="rId59"/>
+    <p:sldId id="264" r:id="rId60"/>
+    <p:sldId id="265" r:id="rId61"/>
+    <p:sldId id="266" r:id="rId62"/>
+    <p:sldId id="267" r:id="rId63"/>
+    <p:sldId id="268" r:id="rId64"/>
   </p:sldIdLst>
   <p:sldSz cx="12192000" cy="6858000"/>
   <p:notesSz cx="6858000" cy="9144000"/>
@@ -355,7 +363,7 @@
             <a:fld id="{B61BEF0D-F0BB-DE4B-95CE-6DB70DBA9567}" type="datetimeFigureOut">
               <a:rPr lang="en-US" dirty="0"/>
               <a:pPr/>
-              <a:t>3/10/2025</a:t>
+              <a:t>3/11/2025</a:t>
             </a:fld>
             <a:endParaRPr lang="en-US" dirty="0"/>
           </a:p>
@@ -690,7 +698,7 @@
             <a:fld id="{B61BEF0D-F0BB-DE4B-95CE-6DB70DBA9567}" type="datetimeFigureOut">
               <a:rPr lang="en-US" dirty="0"/>
               <a:pPr/>
-              <a:t>3/10/2025</a:t>
+              <a:t>3/11/2025</a:t>
             </a:fld>
             <a:endParaRPr lang="en-US" dirty="0"/>
           </a:p>
@@ -1088,7 +1096,7 @@
             <a:fld id="{B61BEF0D-F0BB-DE4B-95CE-6DB70DBA9567}" type="datetimeFigureOut">
               <a:rPr lang="en-US" dirty="0"/>
               <a:pPr/>
-              <a:t>3/10/2025</a:t>
+              <a:t>3/11/2025</a:t>
             </a:fld>
             <a:endParaRPr lang="en-US" dirty="0"/>
           </a:p>
@@ -1421,7 +1429,7 @@
             <a:fld id="{B61BEF0D-F0BB-DE4B-95CE-6DB70DBA9567}" type="datetimeFigureOut">
               <a:rPr lang="en-US" dirty="0"/>
               <a:pPr/>
-              <a:t>3/10/2025</a:t>
+              <a:t>3/11/2025</a:t>
             </a:fld>
             <a:endParaRPr lang="en-US" dirty="0"/>
           </a:p>
@@ -1738,7 +1746,7 @@
             <a:fld id="{B61BEF0D-F0BB-DE4B-95CE-6DB70DBA9567}" type="datetimeFigureOut">
               <a:rPr lang="en-US" dirty="0"/>
               <a:pPr/>
-              <a:t>3/10/2025</a:t>
+              <a:t>3/11/2025</a:t>
             </a:fld>
             <a:endParaRPr lang="en-US" dirty="0"/>
           </a:p>
@@ -2131,7 +2139,7 @@
             <a:fld id="{B61BEF0D-F0BB-DE4B-95CE-6DB70DBA9567}" type="datetimeFigureOut">
               <a:rPr lang="en-US" dirty="0"/>
               <a:pPr/>
-              <a:t>3/10/2025</a:t>
+              <a:t>3/11/2025</a:t>
             </a:fld>
             <a:endParaRPr lang="en-US" dirty="0"/>
           </a:p>
@@ -2385,7 +2393,7 @@
             <a:fld id="{B61BEF0D-F0BB-DE4B-95CE-6DB70DBA9567}" type="datetimeFigureOut">
               <a:rPr lang="en-US" dirty="0"/>
               <a:pPr/>
-              <a:t>3/10/2025</a:t>
+              <a:t>3/11/2025</a:t>
             </a:fld>
             <a:endParaRPr lang="en-US" dirty="0"/>
           </a:p>
@@ -2644,7 +2652,7 @@
             <a:fld id="{B61BEF0D-F0BB-DE4B-95CE-6DB70DBA9567}" type="datetimeFigureOut">
               <a:rPr lang="en-US" dirty="0"/>
               <a:pPr/>
-              <a:t>3/10/2025</a:t>
+              <a:t>3/11/2025</a:t>
             </a:fld>
             <a:endParaRPr lang="en-US" dirty="0"/>
           </a:p>
@@ -2903,7 +2911,7 @@
             <a:fld id="{B61BEF0D-F0BB-DE4B-95CE-6DB70DBA9567}" type="datetimeFigureOut">
               <a:rPr lang="en-US" dirty="0"/>
               <a:pPr/>
-              <a:t>3/10/2025</a:t>
+              <a:t>3/11/2025</a:t>
             </a:fld>
             <a:endParaRPr lang="en-US" dirty="0"/>
           </a:p>
@@ -3229,7 +3237,7 @@
             <a:fld id="{B61BEF0D-F0BB-DE4B-95CE-6DB70DBA9567}" type="datetimeFigureOut">
               <a:rPr lang="en-US" dirty="0"/>
               <a:pPr/>
-              <a:t>3/10/2025</a:t>
+              <a:t>3/11/2025</a:t>
             </a:fld>
             <a:endParaRPr lang="en-US" dirty="0"/>
           </a:p>
@@ -3549,7 +3557,7 @@
             <a:fld id="{B61BEF0D-F0BB-DE4B-95CE-6DB70DBA9567}" type="datetimeFigureOut">
               <a:rPr lang="en-US" dirty="0"/>
               <a:pPr/>
-              <a:t>3/10/2025</a:t>
+              <a:t>3/11/2025</a:t>
             </a:fld>
             <a:endParaRPr lang="en-US" dirty="0"/>
           </a:p>
@@ -4032,7 +4040,7 @@
             <a:fld id="{B61BEF0D-F0BB-DE4B-95CE-6DB70DBA9567}" type="datetimeFigureOut">
               <a:rPr lang="en-US" dirty="0"/>
               <a:pPr/>
-              <a:t>3/10/2025</a:t>
+              <a:t>3/11/2025</a:t>
             </a:fld>
             <a:endParaRPr lang="en-US" dirty="0"/>
           </a:p>
@@ -4234,7 +4242,7 @@
             <a:fld id="{B61BEF0D-F0BB-DE4B-95CE-6DB70DBA9567}" type="datetimeFigureOut">
               <a:rPr lang="en-US" dirty="0"/>
               <a:pPr/>
-              <a:t>3/10/2025</a:t>
+              <a:t>3/11/2025</a:t>
             </a:fld>
             <a:endParaRPr lang="en-US" dirty="0"/>
           </a:p>
@@ -4408,7 +4416,7 @@
             <a:fld id="{B61BEF0D-F0BB-DE4B-95CE-6DB70DBA9567}" type="datetimeFigureOut">
               <a:rPr lang="en-US" dirty="0"/>
               <a:pPr/>
-              <a:t>3/10/2025</a:t>
+              <a:t>3/11/2025</a:t>
             </a:fld>
             <a:endParaRPr lang="en-US" dirty="0"/>
           </a:p>
@@ -4738,7 +4746,7 @@
             <a:fld id="{B61BEF0D-F0BB-DE4B-95CE-6DB70DBA9567}" type="datetimeFigureOut">
               <a:rPr lang="en-US" dirty="0"/>
               <a:pPr/>
-              <a:t>3/10/2025</a:t>
+              <a:t>3/11/2025</a:t>
             </a:fld>
             <a:endParaRPr lang="en-US" dirty="0"/>
           </a:p>
@@ -5080,7 +5088,7 @@
             <a:fld id="{B61BEF0D-F0BB-DE4B-95CE-6DB70DBA9567}" type="datetimeFigureOut">
               <a:rPr lang="en-US" dirty="0"/>
               <a:pPr/>
-              <a:t>3/10/2025</a:t>
+              <a:t>3/11/2025</a:t>
             </a:fld>
             <a:endParaRPr lang="en-US" dirty="0"/>
           </a:p>
@@ -7194,7 +7202,7 @@
             <a:fld id="{B61BEF0D-F0BB-DE4B-95CE-6DB70DBA9567}" type="datetimeFigureOut">
               <a:rPr lang="en-US" dirty="0"/>
               <a:pPr/>
-              <a:t>3/10/2025</a:t>
+              <a:t>3/11/2025</a:t>
             </a:fld>
             <a:endParaRPr lang="en-US" dirty="0"/>
           </a:p>
@@ -14198,7 +14206,6 @@
               <a:rPr lang="en-US" altLang="zh-CN" dirty="0" smtClean="0"/>
               <a:t>Do…while</a:t>
             </a:r>
-            <a:endParaRPr lang="en-US" altLang="zh-CN" dirty="0" smtClean="0"/>
           </a:p>
           <a:p>
             <a:endParaRPr lang="zh-CN" altLang="en-US" dirty="0"/>
@@ -14385,7 +14392,7 @@
           <a:lstStyle/>
           <a:p>
             <a:r>
-              <a:rPr lang="en-US" altLang="zh-CN" smtClean="0"/>
+              <a:rPr lang="en-US" altLang="zh-CN" dirty="0" smtClean="0"/>
               <a:t>3.5 </a:t>
             </a:r>
             <a:r>
@@ -14542,7 +14549,7 @@
               <a:t>章</a:t>
             </a:r>
             <a:r>
-              <a:rPr lang="zh-CN" altLang="en-US" b="1" dirty="0">
+              <a:rPr lang="zh-CN" altLang="en-US" b="1" dirty="0" smtClean="0">
                 <a:latin typeface="华文楷体" pitchFamily="2" charset="-122"/>
                 <a:ea typeface="华文楷体" pitchFamily="2" charset="-122"/>
               </a:rPr>
@@ -14569,7 +14576,18 @@
           <a:p>
             <a:r>
               <a:rPr lang="zh-CN" altLang="en-US" dirty="0"/>
-              <a:t>函数定义与调用：参数传递（值传递、引用传递）、返回值。</a:t>
+              <a:t>函数的作用</a:t>
+            </a:r>
+            <a:endParaRPr lang="en-US" altLang="zh-CN" dirty="0"/>
+          </a:p>
+          <a:p>
+            <a:r>
+              <a:rPr lang="zh-CN" altLang="en-US" dirty="0" smtClean="0"/>
+              <a:t>函数</a:t>
+            </a:r>
+            <a:r>
+              <a:rPr lang="zh-CN" altLang="en-US" dirty="0"/>
+              <a:t>定义与调用：参数传递（值传递、引用传递）、返回值。</a:t>
             </a:r>
           </a:p>
           <a:p>
@@ -14581,8 +14599,20 @@
           <a:p>
             <a:r>
               <a:rPr lang="zh-CN" altLang="en-US" dirty="0"/>
-              <a:t>数组：一维数组、二维数组的定义与使用，数组与指针的关系。</a:t>
-            </a:r>
+              <a:t>数组：一维数组、二维数组的定义与使用，数组与指针的关系</a:t>
+            </a:r>
+            <a:r>
+              <a:rPr lang="zh-CN" altLang="en-US" dirty="0" smtClean="0"/>
+              <a:t>。</a:t>
+            </a:r>
+            <a:endParaRPr lang="en-US" altLang="zh-CN" dirty="0" smtClean="0"/>
+          </a:p>
+          <a:p>
+            <a:r>
+              <a:rPr lang="zh-CN" altLang="en-US" dirty="0"/>
+              <a:t>函数参数使用数组</a:t>
+            </a:r>
+            <a:endParaRPr lang="zh-CN" altLang="en-US" dirty="0"/>
           </a:p>
         </p:txBody>
       </p:sp>
@@ -14639,47 +14669,24 @@
           <a:lstStyle/>
           <a:p>
             <a:r>
-              <a:rPr lang="zh-CN" altLang="en-US" b="1" dirty="0" smtClean="0">
-                <a:latin typeface="华文楷体" pitchFamily="2" charset="-122"/>
-                <a:ea typeface="华文楷体" pitchFamily="2" charset="-122"/>
-              </a:rPr>
-              <a:t>第</a:t>
-            </a:r>
-            <a:r>
-              <a:rPr lang="en-US" altLang="zh-CN" b="1" dirty="0" smtClean="0">
-                <a:latin typeface="华文楷体" pitchFamily="2" charset="-122"/>
-                <a:ea typeface="华文楷体" pitchFamily="2" charset="-122"/>
-              </a:rPr>
-              <a:t>5</a:t>
-            </a:r>
-            <a:r>
-              <a:rPr lang="zh-CN" altLang="en-US" b="1" dirty="0" smtClean="0">
-                <a:latin typeface="华文楷体" pitchFamily="2" charset="-122"/>
-                <a:ea typeface="华文楷体" pitchFamily="2" charset="-122"/>
-              </a:rPr>
-              <a:t>章</a:t>
-            </a:r>
-            <a:r>
-              <a:rPr lang="zh-CN" altLang="en-US" b="1" dirty="0">
-                <a:latin typeface="华文楷体" pitchFamily="2" charset="-122"/>
-                <a:ea typeface="华文楷体" pitchFamily="2" charset="-122"/>
-              </a:rPr>
-              <a:t>面向对象编程（</a:t>
-            </a:r>
-            <a:r>
-              <a:rPr lang="en-US" altLang="zh-CN" b="1" dirty="0">
-                <a:latin typeface="华文楷体" pitchFamily="2" charset="-122"/>
-                <a:ea typeface="华文楷体" pitchFamily="2" charset="-122"/>
-              </a:rPr>
-              <a:t>OOP</a:t>
-            </a:r>
-            <a:r>
-              <a:rPr lang="zh-CN" altLang="en-US" b="1" dirty="0">
-                <a:latin typeface="华文楷体" pitchFamily="2" charset="-122"/>
-                <a:ea typeface="华文楷体" pitchFamily="2" charset="-122"/>
-              </a:rPr>
-              <a:t>）基础</a:t>
-            </a:r>
+              <a:rPr lang="en-US" altLang="zh-CN" b="1" dirty="0" smtClean="0"/>
+              <a:t>4.1</a:t>
+            </a:r>
+            <a:r>
+              <a:rPr lang="zh-CN" altLang="en-US" b="1" dirty="0" smtClean="0"/>
+              <a:t>函数</a:t>
+            </a:r>
+            <a:r>
+              <a:rPr lang="zh-CN" altLang="en-US" b="1" dirty="0"/>
+              <a:t>的作用</a:t>
+            </a:r>
+            <a:r>
+              <a:rPr lang="en-US" altLang="zh-CN" dirty="0"/>
+              <a:t/>
+            </a:r>
+            <a:br>
+              <a:rPr lang="en-US" altLang="zh-CN" dirty="0"/>
+            </a:br>
             <a:endParaRPr lang="zh-CN" altLang="en-US" dirty="0"/>
           </a:p>
         </p:txBody>
@@ -14701,49 +14708,25 @@
           <a:p>
             <a:r>
               <a:rPr lang="zh-CN" altLang="en-US" dirty="0"/>
-              <a:t>类与对象：定义类、创建对象、构造函数与析构函数。</a:t>
-            </a:r>
-          </a:p>
-          <a:p>
-            <a:r>
-              <a:rPr lang="zh-CN" altLang="en-US" dirty="0"/>
-              <a:t>封装：访问控制修饰符（</a:t>
-            </a:r>
-            <a:r>
-              <a:rPr lang="en-US" altLang="zh-CN" dirty="0"/>
-              <a:t>public</a:t>
-            </a:r>
-            <a:r>
-              <a:rPr lang="zh-CN" altLang="en-US" dirty="0"/>
-              <a:t>、</a:t>
-            </a:r>
-            <a:r>
-              <a:rPr lang="en-US" altLang="zh-CN" dirty="0"/>
-              <a:t>private</a:t>
-            </a:r>
-            <a:r>
-              <a:rPr lang="zh-CN" altLang="en-US" dirty="0"/>
-              <a:t>、</a:t>
-            </a:r>
-            <a:r>
-              <a:rPr lang="en-US" altLang="zh-CN" dirty="0"/>
-              <a:t>protected</a:t>
-            </a:r>
-            <a:r>
-              <a:rPr lang="zh-CN" altLang="en-US" dirty="0"/>
-              <a:t>）。</a:t>
-            </a:r>
-          </a:p>
-          <a:p>
-            <a:r>
-              <a:rPr lang="zh-CN" altLang="en-US" dirty="0"/>
-              <a:t>继承：继承的概念、基类与派生类、多重继承。</a:t>
-            </a:r>
-          </a:p>
-          <a:p>
-            <a:r>
-              <a:rPr lang="zh-CN" altLang="en-US" dirty="0"/>
-              <a:t>多态：虚函数、纯虚函数、虚函数的重写、运行时多态。</a:t>
+              <a:t>提高代码的可读性：通过函数将逻辑分块，使代码更加清晰易懂。</a:t>
+            </a:r>
+          </a:p>
+          <a:p>
+            <a:r>
+              <a:rPr lang="zh-CN" altLang="en-US" dirty="0"/>
+              <a:t>增强代码的复用性：相同的功能可以封装为一个函数，在不同的地方重复调用，而不需要复制代码。</a:t>
+            </a:r>
+          </a:p>
+          <a:p>
+            <a:r>
+              <a:rPr lang="zh-CN" altLang="en-US" dirty="0"/>
+              <a:t>简化代码的维护：如果程序需要修改，只需修改函数内部的实现，而不影响整个程序。</a:t>
+            </a:r>
+          </a:p>
+          <a:p>
+            <a:r>
+              <a:rPr lang="zh-CN" altLang="en-US" dirty="0"/>
+              <a:t>模块化编程：将大程序拆分成多个小的、可管理的单元，提高开发效率。</a:t>
             </a:r>
           </a:p>
         </p:txBody>
@@ -14751,20 +14734,13 @@
     </p:spTree>
     <p:extLst>
       <p:ext uri="{BB962C8B-B14F-4D97-AF65-F5344CB8AC3E}">
-        <p14:creationId xmlns:p14="http://schemas.microsoft.com/office/powerpoint/2010/main" val="2413468171"/>
+        <p14:creationId xmlns:p14="http://schemas.microsoft.com/office/powerpoint/2010/main" val="3732899416"/>
       </p:ext>
     </p:extLst>
   </p:cSld>
   <p:clrMapOvr>
     <a:masterClrMapping/>
   </p:clrMapOvr>
-  <p:timing>
-    <p:tnLst>
-      <p:par>
-        <p:cTn id="1" dur="indefinite" restart="never" nodeType="tmRoot"/>
-      </p:par>
-    </p:tnLst>
-  </p:timing>
 </p:sld>
 </file>
 
@@ -14802,11 +14778,15 @@
           <a:p>
             <a:r>
               <a:rPr lang="en-US" altLang="zh-CN" b="1" dirty="0" smtClean="0"/>
-              <a:t>5.1 </a:t>
+              <a:t>4.2 </a:t>
+            </a:r>
+            <a:r>
+              <a:rPr lang="zh-CN" altLang="en-US" b="1" dirty="0" smtClean="0"/>
+              <a:t>函数</a:t>
             </a:r>
             <a:r>
               <a:rPr lang="zh-CN" altLang="en-US" b="1" dirty="0"/>
-              <a:t>为什么使用面向对象</a:t>
+              <a:t>定义与调用</a:t>
             </a:r>
           </a:p>
         </p:txBody>
@@ -14823,36 +14803,66 @@
         </p:nvSpPr>
         <p:spPr/>
         <p:txBody>
-          <a:bodyPr/>
+          <a:bodyPr>
+            <a:normAutofit fontScale="92500" lnSpcReduction="20000"/>
+          </a:bodyPr>
           <a:lstStyle/>
           <a:p>
             <a:r>
               <a:rPr lang="zh-CN" altLang="en-US" dirty="0"/>
-              <a:t>面向对象编程（</a:t>
-            </a:r>
-            <a:r>
-              <a:rPr lang="en-US" altLang="zh-CN" dirty="0"/>
-              <a:t>OOP</a:t>
-            </a:r>
-            <a:r>
-              <a:rPr lang="zh-CN" altLang="en-US" dirty="0"/>
-              <a:t>）是软件开发中的一种编程范式，它与传统的过程化编程（如</a:t>
-            </a:r>
-            <a:r>
-              <a:rPr lang="en-US" altLang="zh-CN" dirty="0"/>
-              <a:t>C</a:t>
-            </a:r>
-            <a:r>
-              <a:rPr lang="zh-CN" altLang="en-US" dirty="0"/>
-              <a:t>语言）相比，提供了更高的灵活性和可维护性。通过将数据和操作数据的方法封装在一起，</a:t>
-            </a:r>
-            <a:r>
-              <a:rPr lang="en-US" altLang="zh-CN" dirty="0"/>
-              <a:t>OOP</a:t>
-            </a:r>
-            <a:r>
-              <a:rPr lang="zh-CN" altLang="en-US" dirty="0"/>
-              <a:t>可以使代码更加模块化、可扩展和易于维护</a:t>
+              <a:t>函数用于封装特定的操作或计算。定义函数时需要指定</a:t>
+            </a:r>
+            <a:r>
+              <a:rPr lang="zh-CN" altLang="en-US" dirty="0">
+                <a:solidFill>
+                  <a:srgbClr val="FF0000"/>
+                </a:solidFill>
+              </a:rPr>
+              <a:t>返回类型</a:t>
+            </a:r>
+            <a:r>
+              <a:rPr lang="zh-CN" altLang="en-US" dirty="0"/>
+              <a:t>、</a:t>
+            </a:r>
+            <a:r>
+              <a:rPr lang="zh-CN" altLang="en-US" dirty="0">
+                <a:solidFill>
+                  <a:srgbClr val="FF0000"/>
+                </a:solidFill>
+              </a:rPr>
+              <a:t>函数名称</a:t>
+            </a:r>
+            <a:r>
+              <a:rPr lang="zh-CN" altLang="en-US" dirty="0"/>
+              <a:t>、</a:t>
+            </a:r>
+            <a:r>
+              <a:rPr lang="zh-CN" altLang="en-US" dirty="0">
+                <a:solidFill>
+                  <a:srgbClr val="FF0000"/>
+                </a:solidFill>
+              </a:rPr>
+              <a:t>参数</a:t>
+            </a:r>
+            <a:r>
+              <a:rPr lang="zh-CN" altLang="en-US" dirty="0" smtClean="0">
+                <a:solidFill>
+                  <a:srgbClr val="FF0000"/>
+                </a:solidFill>
+              </a:rPr>
+              <a:t>类型</a:t>
+            </a:r>
+            <a:r>
+              <a:rPr lang="zh-CN" altLang="en-US" dirty="0" smtClean="0"/>
+              <a:t>以及</a:t>
+            </a:r>
+            <a:r>
+              <a:rPr lang="zh-CN" altLang="en-US" dirty="0">
+                <a:solidFill>
+                  <a:srgbClr val="FF0000"/>
+                </a:solidFill>
+              </a:rPr>
+              <a:t>函数体</a:t>
             </a:r>
             <a:r>
               <a:rPr lang="zh-CN" altLang="en-US" dirty="0" smtClean="0"/>
@@ -14862,38 +14872,147 @@
           </a:p>
           <a:p>
             <a:r>
-              <a:rPr lang="zh-CN" altLang="en-US" dirty="0"/>
-              <a:t>面向对象的</a:t>
-            </a:r>
-            <a:r>
               <a:rPr lang="zh-CN" altLang="en-US" dirty="0" smtClean="0"/>
-              <a:t>优势</a:t>
+              <a:t>函数定义</a:t>
             </a:r>
             <a:endParaRPr lang="en-US" altLang="zh-CN" dirty="0" smtClean="0"/>
           </a:p>
           <a:p>
-            <a:r>
-              <a:rPr lang="zh-CN" altLang="en-US" dirty="0"/>
-              <a:t>与 </a:t>
-            </a:r>
-            <a:r>
-              <a:rPr lang="en-US" altLang="zh-CN" dirty="0"/>
-              <a:t>C </a:t>
-            </a:r>
-            <a:r>
-              <a:rPr lang="zh-CN" altLang="en-US" dirty="0"/>
-              <a:t>语言的</a:t>
-            </a:r>
-            <a:r>
-              <a:rPr lang="zh-CN" altLang="en-US" dirty="0" smtClean="0"/>
-              <a:t>区别</a:t>
-            </a:r>
-            <a:endParaRPr lang="en-US" altLang="zh-CN" dirty="0" smtClean="0"/>
-          </a:p>
-          <a:p>
-            <a:r>
-              <a:rPr lang="zh-CN" altLang="en-US" dirty="0"/>
-              <a:t>为什么选择面向对象编程</a:t>
+            <a:pPr marL="0" indent="0">
+              <a:buNone/>
+            </a:pPr>
+            <a:r>
+              <a:rPr lang="en-US" altLang="zh-CN" dirty="0"/>
+              <a:t>	// </a:t>
+            </a:r>
+            <a:r>
+              <a:rPr lang="zh-CN" altLang="en-US" dirty="0"/>
+              <a:t>定义一个加法函数</a:t>
+            </a:r>
+          </a:p>
+          <a:p>
+            <a:pPr marL="400050" lvl="1" indent="0">
+              <a:buNone/>
+            </a:pPr>
+            <a:r>
+              <a:rPr lang="en-US" altLang="zh-CN" dirty="0" err="1"/>
+              <a:t>int</a:t>
+            </a:r>
+            <a:r>
+              <a:rPr lang="en-US" altLang="zh-CN" dirty="0"/>
+              <a:t> add(</a:t>
+            </a:r>
+            <a:r>
+              <a:rPr lang="en-US" altLang="zh-CN" dirty="0" err="1"/>
+              <a:t>int</a:t>
+            </a:r>
+            <a:r>
+              <a:rPr lang="en-US" altLang="zh-CN" dirty="0"/>
+              <a:t> a, </a:t>
+            </a:r>
+            <a:r>
+              <a:rPr lang="en-US" altLang="zh-CN" dirty="0" err="1"/>
+              <a:t>int</a:t>
+            </a:r>
+            <a:r>
+              <a:rPr lang="en-US" altLang="zh-CN" dirty="0"/>
+              <a:t> b) {</a:t>
+            </a:r>
+          </a:p>
+          <a:p>
+            <a:pPr marL="400050" lvl="1" indent="0">
+              <a:buNone/>
+            </a:pPr>
+            <a:r>
+              <a:rPr lang="en-US" altLang="zh-CN" dirty="0"/>
+              <a:t>    return a + b;</a:t>
+            </a:r>
+          </a:p>
+          <a:p>
+            <a:pPr marL="400050" lvl="1" indent="0">
+              <a:buNone/>
+            </a:pPr>
+            <a:r>
+              <a:rPr lang="en-US" altLang="zh-CN" dirty="0" smtClean="0"/>
+              <a:t>}</a:t>
+            </a:r>
+            <a:endParaRPr lang="en-US" altLang="zh-CN" dirty="0"/>
+          </a:p>
+          <a:p>
+            <a:pPr marL="400050" lvl="1" indent="0">
+              <a:buNone/>
+            </a:pPr>
+            <a:r>
+              <a:rPr lang="en-US" altLang="zh-CN" dirty="0" err="1"/>
+              <a:t>int</a:t>
+            </a:r>
+            <a:r>
+              <a:rPr lang="en-US" altLang="zh-CN" dirty="0"/>
+              <a:t> main() {</a:t>
+            </a:r>
+          </a:p>
+          <a:p>
+            <a:pPr marL="400050" lvl="1" indent="0">
+              <a:buNone/>
+            </a:pPr>
+            <a:r>
+              <a:rPr lang="en-US" altLang="zh-CN" dirty="0"/>
+              <a:t>    </a:t>
+            </a:r>
+            <a:r>
+              <a:rPr lang="en-US" altLang="zh-CN" dirty="0" err="1"/>
+              <a:t>int</a:t>
+            </a:r>
+            <a:r>
+              <a:rPr lang="en-US" altLang="zh-CN" dirty="0"/>
+              <a:t> result = add(3, 4);  // </a:t>
+            </a:r>
+            <a:r>
+              <a:rPr lang="zh-CN" altLang="en-US" dirty="0"/>
+              <a:t>调用函数</a:t>
+            </a:r>
+          </a:p>
+          <a:p>
+            <a:pPr marL="400050" lvl="1" indent="0">
+              <a:buNone/>
+            </a:pPr>
+            <a:r>
+              <a:rPr lang="zh-CN" altLang="en-US" dirty="0"/>
+              <a:t>    </a:t>
+            </a:r>
+            <a:r>
+              <a:rPr lang="en-US" altLang="zh-CN" dirty="0" err="1"/>
+              <a:t>cout</a:t>
+            </a:r>
+            <a:r>
+              <a:rPr lang="en-US" altLang="zh-CN" dirty="0"/>
+              <a:t> &lt;&lt; "Result: " &lt;&lt; result &lt;&lt; </a:t>
+            </a:r>
+            <a:r>
+              <a:rPr lang="en-US" altLang="zh-CN" dirty="0" err="1"/>
+              <a:t>endl</a:t>
+            </a:r>
+            <a:r>
+              <a:rPr lang="en-US" altLang="zh-CN" dirty="0"/>
+              <a:t>;</a:t>
+            </a:r>
+          </a:p>
+          <a:p>
+            <a:pPr marL="400050" lvl="1" indent="0">
+              <a:buNone/>
+            </a:pPr>
+            <a:r>
+              <a:rPr lang="en-US" altLang="zh-CN" dirty="0"/>
+              <a:t>    return 0;</a:t>
+            </a:r>
+          </a:p>
+          <a:p>
+            <a:pPr marL="400050" lvl="1" indent="0">
+              <a:buNone/>
+            </a:pPr>
+            <a:r>
+              <a:rPr lang="en-US" altLang="zh-CN" dirty="0" smtClean="0"/>
+              <a:t>}</a:t>
             </a:r>
           </a:p>
         </p:txBody>
@@ -14901,7 +15020,7 @@
     </p:spTree>
     <p:extLst>
       <p:ext uri="{BB962C8B-B14F-4D97-AF65-F5344CB8AC3E}">
-        <p14:creationId xmlns:p14="http://schemas.microsoft.com/office/powerpoint/2010/main" val="329754630"/>
+        <p14:creationId xmlns:p14="http://schemas.microsoft.com/office/powerpoint/2010/main" val="3706298998"/>
       </p:ext>
     </p:extLst>
   </p:cSld>
@@ -15092,14 +15211,14 @@
           <a:p>
             <a:r>
               <a:rPr lang="zh-CN" altLang="en-US" b="1" dirty="0"/>
-              <a:t>面向对象的优势</a:t>
-            </a:r>
-            <a:r>
-              <a:rPr lang="en-US" altLang="zh-CN" dirty="0"/>
+              <a:t>参数传递</a:t>
+            </a:r>
+            <a:r>
+              <a:rPr lang="zh-CN" altLang="en-US" dirty="0"/>
               <a:t/>
             </a:r>
             <a:br>
-              <a:rPr lang="en-US" altLang="zh-CN" dirty="0"/>
+              <a:rPr lang="zh-CN" altLang="en-US" dirty="0"/>
             </a:br>
             <a:endParaRPr lang="zh-CN" altLang="en-US" dirty="0"/>
           </a:p>
@@ -15122,49 +15241,68 @@
           <a:p>
             <a:r>
               <a:rPr lang="zh-CN" altLang="en-US" dirty="0"/>
-              <a:t>封装：</a:t>
-            </a:r>
-            <a:r>
-              <a:rPr lang="en-US" altLang="zh-CN" dirty="0"/>
-              <a:t>OOP</a:t>
-            </a:r>
-            <a:r>
-              <a:rPr lang="zh-CN" altLang="en-US" dirty="0"/>
-              <a:t>鼓励将数据与数据操作封装在一起，减少数据访问的复杂性。通过封装，类的实现细节可以隐藏，外部代码只需关注接口而非实现。</a:t>
-            </a:r>
-          </a:p>
-          <a:p>
-            <a:r>
-              <a:rPr lang="zh-CN" altLang="en-US" dirty="0"/>
-              <a:t>继承：继承允许类继承另一个类的属性和方法，减少代码的重复，增强代码的重用性。</a:t>
-            </a:r>
-          </a:p>
-          <a:p>
-            <a:r>
-              <a:rPr lang="zh-CN" altLang="en-US" dirty="0"/>
-              <a:t>多态：多态使得同一操作可以在不同类型的对象上表现出不同的行为，提高了代码的灵活性。</a:t>
-            </a:r>
-          </a:p>
-          <a:p>
-            <a:r>
-              <a:rPr lang="zh-CN" altLang="en-US" dirty="0"/>
-              <a:t>模块化与可维护性：</a:t>
-            </a:r>
-            <a:r>
-              <a:rPr lang="en-US" altLang="zh-CN" dirty="0"/>
-              <a:t>OOP</a:t>
-            </a:r>
-            <a:r>
-              <a:rPr lang="zh-CN" altLang="en-US" dirty="0"/>
-              <a:t>允许将一个大程序拆分成多个小模块，每个模块负责自己独立的功能，增强了代码的可维护性和扩展性。</a:t>
-            </a:r>
+              <a:t>值传递</a:t>
+            </a:r>
+            <a:r>
+              <a:rPr lang="zh-CN" altLang="en-US" dirty="0" smtClean="0"/>
+              <a:t>：</a:t>
+            </a:r>
+            <a:endParaRPr lang="en-US" altLang="zh-CN" dirty="0" smtClean="0"/>
+          </a:p>
+          <a:p>
+            <a:pPr marL="0" indent="0">
+              <a:buNone/>
+            </a:pPr>
+            <a:r>
+              <a:rPr lang="en-US" altLang="zh-CN" dirty="0"/>
+              <a:t>	</a:t>
+            </a:r>
+            <a:r>
+              <a:rPr lang="zh-CN" altLang="en-US" dirty="0" smtClean="0"/>
+              <a:t>将</a:t>
+            </a:r>
+            <a:r>
+              <a:rPr lang="zh-CN" altLang="en-US" dirty="0"/>
+              <a:t>参数的值复制给函数的参数变量。</a:t>
+            </a:r>
+          </a:p>
+          <a:p>
+            <a:r>
+              <a:rPr lang="zh-CN" altLang="en-US" dirty="0"/>
+              <a:t>引用传递</a:t>
+            </a:r>
+            <a:r>
+              <a:rPr lang="zh-CN" altLang="en-US" dirty="0" smtClean="0"/>
+              <a:t>：</a:t>
+            </a:r>
+            <a:endParaRPr lang="en-US" altLang="zh-CN" dirty="0" smtClean="0"/>
+          </a:p>
+          <a:p>
+            <a:pPr marL="0" indent="0">
+              <a:buNone/>
+            </a:pPr>
+            <a:r>
+              <a:rPr lang="en-US" altLang="zh-CN" dirty="0"/>
+              <a:t>	</a:t>
+            </a:r>
+            <a:r>
+              <a:rPr lang="zh-CN" altLang="en-US" dirty="0" smtClean="0"/>
+              <a:t>传递</a:t>
+            </a:r>
+            <a:r>
+              <a:rPr lang="zh-CN" altLang="en-US" dirty="0"/>
+              <a:t>参数的引用，函数内对参数的修改会影响原变量。</a:t>
+            </a:r>
+          </a:p>
+          <a:p>
+            <a:endParaRPr lang="zh-CN" altLang="en-US" dirty="0"/>
           </a:p>
         </p:txBody>
       </p:sp>
     </p:spTree>
     <p:extLst>
       <p:ext uri="{BB962C8B-B14F-4D97-AF65-F5344CB8AC3E}">
-        <p14:creationId xmlns:p14="http://schemas.microsoft.com/office/powerpoint/2010/main" val="1941399030"/>
+        <p14:creationId xmlns:p14="http://schemas.microsoft.com/office/powerpoint/2010/main" val="4032471405"/>
       </p:ext>
     </p:extLst>
   </p:cSld>
@@ -15207,6 +15345,1717 @@
           <a:lstStyle/>
           <a:p>
             <a:r>
+              <a:rPr lang="en-US" altLang="zh-CN" b="1" dirty="0" smtClean="0"/>
+              <a:t>4.3 </a:t>
+            </a:r>
+            <a:r>
+              <a:rPr lang="zh-CN" altLang="en-US" b="1" dirty="0"/>
+              <a:t>函数重载与递归</a:t>
+            </a:r>
+          </a:p>
+        </p:txBody>
+      </p:sp>
+      <p:sp>
+        <p:nvSpPr>
+          <p:cNvPr id="3" name="内容占位符 2"/>
+          <p:cNvSpPr>
+            <a:spLocks noGrp="1"/>
+          </p:cNvSpPr>
+          <p:nvPr>
+            <p:ph idx="1"/>
+          </p:nvPr>
+        </p:nvSpPr>
+        <p:spPr/>
+        <p:txBody>
+          <a:bodyPr/>
+          <a:lstStyle/>
+          <a:p>
+            <a:r>
+              <a:rPr lang="zh-CN" altLang="en-US" b="1" dirty="0"/>
+              <a:t>函数重载</a:t>
+            </a:r>
+          </a:p>
+          <a:p>
+            <a:pPr marL="0" indent="0">
+              <a:buNone/>
+            </a:pPr>
+            <a:r>
+              <a:rPr lang="en-US" altLang="zh-CN" dirty="0" smtClean="0"/>
+              <a:t>	</a:t>
+            </a:r>
+            <a:r>
+              <a:rPr lang="zh-CN" altLang="en-US" dirty="0" smtClean="0"/>
+              <a:t>函数</a:t>
+            </a:r>
+            <a:r>
+              <a:rPr lang="zh-CN" altLang="en-US" dirty="0"/>
+              <a:t>重载是指在同一作用域内可以定义多个同名的函数，只要它们的参数类型或</a:t>
+            </a:r>
+            <a:r>
+              <a:rPr lang="zh-CN" altLang="en-US" dirty="0" smtClean="0"/>
+              <a:t>个</a:t>
+            </a:r>
+            <a:r>
+              <a:rPr lang="en-US" altLang="zh-CN" dirty="0" smtClean="0"/>
+              <a:t>	</a:t>
+            </a:r>
+            <a:r>
+              <a:rPr lang="zh-CN" altLang="en-US" dirty="0" smtClean="0"/>
+              <a:t>数</a:t>
+            </a:r>
+            <a:r>
+              <a:rPr lang="zh-CN" altLang="en-US" dirty="0"/>
+              <a:t>不同。</a:t>
+            </a:r>
+          </a:p>
+          <a:p>
+            <a:r>
+              <a:rPr lang="zh-CN" altLang="en-US" b="1" dirty="0"/>
+              <a:t>递归函数</a:t>
+            </a:r>
+          </a:p>
+          <a:p>
+            <a:pPr marL="0" indent="0">
+              <a:buNone/>
+            </a:pPr>
+            <a:r>
+              <a:rPr lang="en-US" altLang="zh-CN" dirty="0" smtClean="0"/>
+              <a:t>	</a:t>
+            </a:r>
+            <a:r>
+              <a:rPr lang="zh-CN" altLang="en-US" dirty="0" smtClean="0"/>
+              <a:t>递归</a:t>
+            </a:r>
+            <a:r>
+              <a:rPr lang="zh-CN" altLang="en-US" dirty="0"/>
+              <a:t>是函数调用自身。递归函数通常包括基准情况和递归调用。</a:t>
+            </a:r>
+          </a:p>
+          <a:p>
+            <a:endParaRPr lang="zh-CN" altLang="en-US" dirty="0"/>
+          </a:p>
+        </p:txBody>
+      </p:sp>
+    </p:spTree>
+    <p:extLst>
+      <p:ext uri="{BB962C8B-B14F-4D97-AF65-F5344CB8AC3E}">
+        <p14:creationId xmlns:p14="http://schemas.microsoft.com/office/powerpoint/2010/main" val="3246053325"/>
+      </p:ext>
+    </p:extLst>
+  </p:cSld>
+  <p:clrMapOvr>
+    <a:masterClrMapping/>
+  </p:clrMapOvr>
+</p:sld>
+</file>
+
+<file path=ppt/slides/slide42.xml><?xml version="1.0" encoding="utf-8"?>
+<p:sld xmlns:a="http://schemas.openxmlformats.org/drawingml/2006/main" xmlns:r="http://schemas.openxmlformats.org/officeDocument/2006/relationships" xmlns:p="http://schemas.openxmlformats.org/presentationml/2006/main">
+  <p:cSld>
+    <p:spTree>
+      <p:nvGrpSpPr>
+        <p:cNvPr id="1" name=""/>
+        <p:cNvGrpSpPr/>
+        <p:nvPr/>
+      </p:nvGrpSpPr>
+      <p:grpSpPr>
+        <a:xfrm>
+          <a:off x="0" y="0"/>
+          <a:ext cx="0" cy="0"/>
+          <a:chOff x="0" y="0"/>
+          <a:chExt cx="0" cy="0"/>
+        </a:xfrm>
+      </p:grpSpPr>
+      <p:sp>
+        <p:nvSpPr>
+          <p:cNvPr id="2" name="标题 1"/>
+          <p:cNvSpPr>
+            <a:spLocks noGrp="1"/>
+          </p:cNvSpPr>
+          <p:nvPr>
+            <p:ph type="title"/>
+          </p:nvPr>
+        </p:nvSpPr>
+        <p:spPr/>
+        <p:txBody>
+          <a:bodyPr/>
+          <a:lstStyle/>
+          <a:p>
+            <a:r>
+              <a:rPr lang="en-US" altLang="zh-CN" b="1" dirty="0" smtClean="0"/>
+              <a:t>4.4 </a:t>
+            </a:r>
+            <a:r>
+              <a:rPr lang="zh-CN" altLang="en-US" b="1" dirty="0"/>
+              <a:t>数组</a:t>
+            </a:r>
+          </a:p>
+        </p:txBody>
+      </p:sp>
+      <p:sp>
+        <p:nvSpPr>
+          <p:cNvPr id="3" name="内容占位符 2"/>
+          <p:cNvSpPr>
+            <a:spLocks noGrp="1"/>
+          </p:cNvSpPr>
+          <p:nvPr>
+            <p:ph idx="1"/>
+          </p:nvPr>
+        </p:nvSpPr>
+        <p:spPr/>
+        <p:txBody>
+          <a:bodyPr>
+            <a:normAutofit/>
+          </a:bodyPr>
+          <a:lstStyle/>
+          <a:p>
+            <a:r>
+              <a:rPr lang="zh-CN" altLang="en-US" b="1" dirty="0"/>
+              <a:t>一维数组</a:t>
+            </a:r>
+          </a:p>
+          <a:p>
+            <a:pPr marL="0" indent="0">
+              <a:buNone/>
+            </a:pPr>
+            <a:r>
+              <a:rPr lang="en-US" altLang="zh-CN" dirty="0" smtClean="0"/>
+              <a:t>	</a:t>
+            </a:r>
+            <a:r>
+              <a:rPr lang="zh-CN" altLang="en-US" dirty="0" smtClean="0"/>
+              <a:t>一</a:t>
+            </a:r>
+            <a:r>
+              <a:rPr lang="zh-CN" altLang="en-US" dirty="0"/>
+              <a:t>维数组是具有相同类型元素的集合，元素通过索引访问。</a:t>
+            </a:r>
+          </a:p>
+          <a:p>
+            <a:r>
+              <a:rPr lang="zh-CN" altLang="en-US" b="1" dirty="0"/>
+              <a:t>二维数组</a:t>
+            </a:r>
+          </a:p>
+          <a:p>
+            <a:pPr marL="0" indent="0">
+              <a:buNone/>
+            </a:pPr>
+            <a:r>
+              <a:rPr lang="en-US" altLang="zh-CN" dirty="0" smtClean="0"/>
+              <a:t>	</a:t>
+            </a:r>
+            <a:r>
+              <a:rPr lang="zh-CN" altLang="en-US" dirty="0" smtClean="0"/>
+              <a:t>二</a:t>
+            </a:r>
+            <a:r>
+              <a:rPr lang="zh-CN" altLang="en-US" dirty="0"/>
+              <a:t>维数组是数组的数组。可以通过指定两个索引访问元素。</a:t>
+            </a:r>
+          </a:p>
+          <a:p>
+            <a:r>
+              <a:rPr lang="zh-CN" altLang="en-US" b="1" dirty="0"/>
+              <a:t>数组与指针的</a:t>
+            </a:r>
+            <a:r>
+              <a:rPr lang="zh-CN" altLang="en-US" b="1" dirty="0" smtClean="0"/>
+              <a:t>关系</a:t>
+            </a:r>
+            <a:endParaRPr lang="en-US" altLang="zh-CN" b="1" dirty="0" smtClean="0"/>
+          </a:p>
+          <a:p>
+            <a:pPr marL="0" indent="0">
+              <a:buNone/>
+            </a:pPr>
+            <a:r>
+              <a:rPr lang="en-US" altLang="zh-CN" dirty="0" smtClean="0"/>
+              <a:t>	</a:t>
+            </a:r>
+            <a:r>
+              <a:rPr lang="zh-CN" altLang="en-US" dirty="0" smtClean="0"/>
+              <a:t>数组</a:t>
+            </a:r>
+            <a:r>
+              <a:rPr lang="zh-CN" altLang="en-US" dirty="0"/>
+              <a:t>名在很多情况下会退化为指向数组首元素的指针。因此，可以使用指针来访问</a:t>
+            </a:r>
+            <a:r>
+              <a:rPr lang="en-US" altLang="zh-CN" dirty="0"/>
+              <a:t>	</a:t>
+            </a:r>
+            <a:r>
+              <a:rPr lang="zh-CN" altLang="en-US" dirty="0"/>
+              <a:t>数组元素</a:t>
+            </a:r>
+            <a:r>
+              <a:rPr lang="zh-CN" altLang="en-US" dirty="0" smtClean="0"/>
+              <a:t>。</a:t>
+            </a:r>
+            <a:endParaRPr lang="en-US" altLang="zh-CN" dirty="0"/>
+          </a:p>
+        </p:txBody>
+      </p:sp>
+    </p:spTree>
+    <p:extLst>
+      <p:ext uri="{BB962C8B-B14F-4D97-AF65-F5344CB8AC3E}">
+        <p14:creationId xmlns:p14="http://schemas.microsoft.com/office/powerpoint/2010/main" val="2859311749"/>
+      </p:ext>
+    </p:extLst>
+  </p:cSld>
+  <p:clrMapOvr>
+    <a:masterClrMapping/>
+  </p:clrMapOvr>
+</p:sld>
+</file>
+
+<file path=ppt/slides/slide43.xml><?xml version="1.0" encoding="utf-8"?>
+<p:sld xmlns:a="http://schemas.openxmlformats.org/drawingml/2006/main" xmlns:r="http://schemas.openxmlformats.org/officeDocument/2006/relationships" xmlns:p="http://schemas.openxmlformats.org/presentationml/2006/main">
+  <p:cSld>
+    <p:spTree>
+      <p:nvGrpSpPr>
+        <p:cNvPr id="1" name=""/>
+        <p:cNvGrpSpPr/>
+        <p:nvPr/>
+      </p:nvGrpSpPr>
+      <p:grpSpPr>
+        <a:xfrm>
+          <a:off x="0" y="0"/>
+          <a:ext cx="0" cy="0"/>
+          <a:chOff x="0" y="0"/>
+          <a:chExt cx="0" cy="0"/>
+        </a:xfrm>
+      </p:grpSpPr>
+      <p:sp>
+        <p:nvSpPr>
+          <p:cNvPr id="2" name="标题 1"/>
+          <p:cNvSpPr>
+            <a:spLocks noGrp="1"/>
+          </p:cNvSpPr>
+          <p:nvPr>
+            <p:ph type="title"/>
+          </p:nvPr>
+        </p:nvSpPr>
+        <p:spPr/>
+        <p:txBody>
+          <a:bodyPr/>
+          <a:lstStyle/>
+          <a:p>
+            <a:r>
+              <a:rPr lang="en-US" altLang="zh-CN" b="1" dirty="0" smtClean="0"/>
+              <a:t>4.5 </a:t>
+            </a:r>
+            <a:r>
+              <a:rPr lang="zh-CN" altLang="en-US" b="1" dirty="0" smtClean="0"/>
+              <a:t>函数</a:t>
+            </a:r>
+            <a:r>
+              <a:rPr lang="zh-CN" altLang="en-US" b="1" dirty="0"/>
+              <a:t>参数</a:t>
+            </a:r>
+            <a:r>
+              <a:rPr lang="zh-CN" altLang="en-US" b="1" dirty="0" smtClean="0"/>
+              <a:t>使用数组</a:t>
+            </a:r>
+            <a:endParaRPr lang="zh-CN" altLang="en-US" b="1" dirty="0"/>
+          </a:p>
+        </p:txBody>
+      </p:sp>
+      <p:sp>
+        <p:nvSpPr>
+          <p:cNvPr id="3" name="内容占位符 2"/>
+          <p:cNvSpPr>
+            <a:spLocks noGrp="1"/>
+          </p:cNvSpPr>
+          <p:nvPr>
+            <p:ph idx="1"/>
+          </p:nvPr>
+        </p:nvSpPr>
+        <p:spPr/>
+        <p:txBody>
+          <a:bodyPr/>
+          <a:lstStyle/>
+          <a:p>
+            <a:r>
+              <a:rPr lang="zh-CN" altLang="en-US" dirty="0"/>
+              <a:t>在 </a:t>
+            </a:r>
+            <a:r>
+              <a:rPr lang="en-US" altLang="zh-CN" dirty="0"/>
+              <a:t>C++ </a:t>
+            </a:r>
+            <a:r>
+              <a:rPr lang="zh-CN" altLang="en-US" dirty="0"/>
+              <a:t>中，</a:t>
+            </a:r>
+            <a:r>
+              <a:rPr lang="zh-CN" altLang="en-US" b="1" dirty="0"/>
+              <a:t>数组可以作为函数的参数</a:t>
+            </a:r>
+            <a:r>
+              <a:rPr lang="zh-CN" altLang="en-US" dirty="0"/>
+              <a:t> 进行传递</a:t>
+            </a:r>
+            <a:r>
+              <a:rPr lang="zh-CN" altLang="en-US" dirty="0" smtClean="0"/>
+              <a:t>。</a:t>
+            </a:r>
+            <a:endParaRPr lang="en-US" altLang="zh-CN" dirty="0" smtClean="0"/>
+          </a:p>
+          <a:p>
+            <a:pPr marL="0" indent="0">
+              <a:buNone/>
+            </a:pPr>
+            <a:r>
+              <a:rPr lang="en-US" altLang="zh-CN" dirty="0"/>
+              <a:t>	</a:t>
+            </a:r>
+            <a:r>
+              <a:rPr lang="zh-CN" altLang="en-US" dirty="0" smtClean="0"/>
+              <a:t>由于</a:t>
+            </a:r>
+            <a:r>
+              <a:rPr lang="zh-CN" altLang="en-US" dirty="0"/>
+              <a:t>数组本质上是指针，传递数组参数时，实际上传递的是</a:t>
+            </a:r>
+            <a:r>
+              <a:rPr lang="zh-CN" altLang="en-US" b="1" dirty="0"/>
+              <a:t>数组的地址</a:t>
+            </a:r>
+            <a:r>
+              <a:rPr lang="zh-CN" altLang="en-US" dirty="0"/>
+              <a:t>，这</a:t>
+            </a:r>
+            <a:r>
+              <a:rPr lang="zh-CN" altLang="en-US" dirty="0" smtClean="0"/>
+              <a:t>意味着</a:t>
+            </a:r>
+            <a:endParaRPr lang="en-US" altLang="zh-CN" dirty="0" smtClean="0"/>
+          </a:p>
+          <a:p>
+            <a:pPr marL="0" indent="0">
+              <a:buNone/>
+            </a:pPr>
+            <a:r>
+              <a:rPr lang="en-US" altLang="zh-CN" dirty="0"/>
+              <a:t>	</a:t>
+            </a:r>
+            <a:r>
+              <a:rPr lang="zh-CN" altLang="en-US" dirty="0" smtClean="0"/>
+              <a:t>函数</a:t>
+            </a:r>
+            <a:r>
+              <a:rPr lang="zh-CN" altLang="en-US" dirty="0"/>
+              <a:t>内部可以修改原数组的内容</a:t>
+            </a:r>
+            <a:r>
+              <a:rPr lang="zh-CN" altLang="en-US" dirty="0" smtClean="0"/>
+              <a:t>。</a:t>
+            </a:r>
+            <a:endParaRPr lang="en-US" altLang="zh-CN" dirty="0" smtClean="0"/>
+          </a:p>
+          <a:p>
+            <a:r>
+              <a:rPr lang="zh-CN" altLang="en-US" dirty="0"/>
+              <a:t>语法格式</a:t>
+            </a:r>
+            <a:r>
+              <a:rPr lang="zh-CN" altLang="en-US" dirty="0" smtClean="0"/>
+              <a:t>：</a:t>
+            </a:r>
+            <a:endParaRPr lang="en-US" altLang="zh-CN" dirty="0" smtClean="0"/>
+          </a:p>
+          <a:p>
+            <a:pPr marL="0" indent="0">
+              <a:buNone/>
+            </a:pPr>
+            <a:r>
+              <a:rPr lang="en-US" altLang="zh-CN" dirty="0" smtClean="0"/>
+              <a:t>	void </a:t>
+            </a:r>
+            <a:r>
+              <a:rPr lang="en-US" altLang="zh-CN" dirty="0" err="1"/>
+              <a:t>functionName</a:t>
+            </a:r>
+            <a:r>
+              <a:rPr lang="en-US" altLang="zh-CN" dirty="0"/>
+              <a:t>(</a:t>
+            </a:r>
+            <a:r>
+              <a:rPr lang="en-US" altLang="zh-CN" dirty="0" err="1"/>
+              <a:t>dataType</a:t>
+            </a:r>
+            <a:r>
+              <a:rPr lang="en-US" altLang="zh-CN" dirty="0"/>
+              <a:t> </a:t>
+            </a:r>
+            <a:r>
+              <a:rPr lang="en-US" altLang="zh-CN" dirty="0" err="1"/>
+              <a:t>arrayName</a:t>
+            </a:r>
+            <a:r>
+              <a:rPr lang="en-US" altLang="zh-CN" dirty="0"/>
+              <a:t>[], </a:t>
+            </a:r>
+            <a:r>
+              <a:rPr lang="en-US" altLang="zh-CN" dirty="0" err="1"/>
+              <a:t>int</a:t>
+            </a:r>
+            <a:r>
+              <a:rPr lang="en-US" altLang="zh-CN" dirty="0"/>
+              <a:t> size</a:t>
+            </a:r>
+            <a:r>
+              <a:rPr lang="en-US" altLang="zh-CN" dirty="0" smtClean="0"/>
+              <a:t>);</a:t>
+            </a:r>
+          </a:p>
+          <a:p>
+            <a:pPr marL="0" indent="0">
+              <a:buNone/>
+            </a:pPr>
+            <a:r>
+              <a:rPr lang="en-US" altLang="zh-CN" dirty="0"/>
+              <a:t>	</a:t>
+            </a:r>
+            <a:r>
+              <a:rPr lang="en-US" altLang="zh-CN" dirty="0" smtClean="0"/>
+              <a:t>void </a:t>
+            </a:r>
+            <a:r>
+              <a:rPr lang="en-US" altLang="zh-CN" dirty="0" err="1"/>
+              <a:t>functionName</a:t>
+            </a:r>
+            <a:r>
+              <a:rPr lang="en-US" altLang="zh-CN" dirty="0"/>
+              <a:t>(</a:t>
+            </a:r>
+            <a:r>
+              <a:rPr lang="en-US" altLang="zh-CN" dirty="0" err="1"/>
+              <a:t>dataType</a:t>
+            </a:r>
+            <a:r>
+              <a:rPr lang="en-US" altLang="zh-CN" dirty="0"/>
+              <a:t>* </a:t>
+            </a:r>
+            <a:r>
+              <a:rPr lang="en-US" altLang="zh-CN" dirty="0" err="1"/>
+              <a:t>arrayName</a:t>
+            </a:r>
+            <a:r>
+              <a:rPr lang="en-US" altLang="zh-CN" dirty="0"/>
+              <a:t>, </a:t>
+            </a:r>
+            <a:r>
+              <a:rPr lang="en-US" altLang="zh-CN" dirty="0" err="1"/>
+              <a:t>int</a:t>
+            </a:r>
+            <a:r>
+              <a:rPr lang="en-US" altLang="zh-CN" dirty="0"/>
+              <a:t> size);</a:t>
+            </a:r>
+          </a:p>
+          <a:p>
+            <a:r>
+              <a:rPr lang="zh-CN" altLang="en-US" dirty="0" smtClean="0"/>
+              <a:t>注意</a:t>
+            </a:r>
+            <a:endParaRPr lang="en-US" altLang="zh-CN" dirty="0" smtClean="0"/>
+          </a:p>
+          <a:p>
+            <a:pPr lvl="1"/>
+            <a:r>
+              <a:rPr lang="zh-CN" altLang="en-US" dirty="0"/>
+              <a:t>由于数组作为参数时实际传递的是指针，所以函数内部对数组的修改会影响原数组。</a:t>
+            </a:r>
+          </a:p>
+          <a:p>
+            <a:pPr lvl="1"/>
+            <a:r>
+              <a:rPr lang="zh-CN" altLang="en-US" dirty="0"/>
+              <a:t>需要提供数组的 大小（</a:t>
+            </a:r>
+            <a:r>
+              <a:rPr lang="en-US" altLang="zh-CN" dirty="0"/>
+              <a:t>size</a:t>
+            </a:r>
+            <a:r>
+              <a:rPr lang="zh-CN" altLang="en-US" dirty="0"/>
+              <a:t>），否则无法正确遍历数组。</a:t>
+            </a:r>
+          </a:p>
+        </p:txBody>
+      </p:sp>
+    </p:spTree>
+    <p:extLst>
+      <p:ext uri="{BB962C8B-B14F-4D97-AF65-F5344CB8AC3E}">
+        <p14:creationId xmlns:p14="http://schemas.microsoft.com/office/powerpoint/2010/main" val="1038020837"/>
+      </p:ext>
+    </p:extLst>
+  </p:cSld>
+  <p:clrMapOvr>
+    <a:masterClrMapping/>
+  </p:clrMapOvr>
+</p:sld>
+</file>
+
+<file path=ppt/slides/slide44.xml><?xml version="1.0" encoding="utf-8"?>
+<p:sld xmlns:a="http://schemas.openxmlformats.org/drawingml/2006/main" xmlns:r="http://schemas.openxmlformats.org/officeDocument/2006/relationships" xmlns:p="http://schemas.openxmlformats.org/presentationml/2006/main">
+  <p:cSld>
+    <p:spTree>
+      <p:nvGrpSpPr>
+        <p:cNvPr id="1" name=""/>
+        <p:cNvGrpSpPr/>
+        <p:nvPr/>
+      </p:nvGrpSpPr>
+      <p:grpSpPr>
+        <a:xfrm>
+          <a:off x="0" y="0"/>
+          <a:ext cx="0" cy="0"/>
+          <a:chOff x="0" y="0"/>
+          <a:chExt cx="0" cy="0"/>
+        </a:xfrm>
+      </p:grpSpPr>
+      <p:sp>
+        <p:nvSpPr>
+          <p:cNvPr id="2" name="标题 1"/>
+          <p:cNvSpPr>
+            <a:spLocks noGrp="1"/>
+          </p:cNvSpPr>
+          <p:nvPr>
+            <p:ph type="title"/>
+          </p:nvPr>
+        </p:nvSpPr>
+        <p:spPr/>
+        <p:txBody>
+          <a:bodyPr/>
+          <a:lstStyle/>
+          <a:p>
+            <a:r>
+              <a:rPr lang="zh-CN" altLang="en-US" b="1" dirty="0" smtClean="0"/>
+              <a:t>示例</a:t>
+            </a:r>
+            <a:endParaRPr lang="zh-CN" altLang="en-US" b="1" dirty="0"/>
+          </a:p>
+        </p:txBody>
+      </p:sp>
+      <p:sp>
+        <p:nvSpPr>
+          <p:cNvPr id="3" name="内容占位符 2"/>
+          <p:cNvSpPr>
+            <a:spLocks noGrp="1"/>
+          </p:cNvSpPr>
+          <p:nvPr>
+            <p:ph idx="1"/>
+          </p:nvPr>
+        </p:nvSpPr>
+        <p:spPr/>
+        <p:txBody>
+          <a:bodyPr/>
+          <a:lstStyle/>
+          <a:p>
+            <a:r>
+              <a:rPr lang="zh-CN" altLang="en-US" dirty="0"/>
+              <a:t>数组</a:t>
+            </a:r>
+            <a:r>
+              <a:rPr lang="zh-CN" altLang="en-US" dirty="0" smtClean="0"/>
+              <a:t>求和</a:t>
+            </a:r>
+            <a:endParaRPr lang="en-US" altLang="zh-CN" dirty="0" smtClean="0"/>
+          </a:p>
+          <a:p>
+            <a:r>
+              <a:rPr lang="zh-CN" altLang="en-US" dirty="0"/>
+              <a:t>修改数组中</a:t>
+            </a:r>
+            <a:r>
+              <a:rPr lang="zh-CN" altLang="en-US" dirty="0" smtClean="0"/>
+              <a:t>的元素</a:t>
+            </a:r>
+            <a:endParaRPr lang="en-US" altLang="zh-CN" dirty="0" smtClean="0"/>
+          </a:p>
+          <a:p>
+            <a:r>
+              <a:rPr lang="zh-CN" altLang="en-US" dirty="0"/>
+              <a:t>传递二维数</a:t>
+            </a:r>
+            <a:r>
+              <a:rPr lang="zh-CN" altLang="en-US" dirty="0" smtClean="0"/>
+              <a:t>组</a:t>
+            </a:r>
+            <a:endParaRPr lang="en-US" altLang="zh-CN" dirty="0" smtClean="0"/>
+          </a:p>
+          <a:p>
+            <a:r>
+              <a:rPr lang="zh-CN" altLang="en-US" dirty="0"/>
+              <a:t>使用指针修改数组元素</a:t>
+            </a:r>
+          </a:p>
+        </p:txBody>
+      </p:sp>
+    </p:spTree>
+    <p:extLst>
+      <p:ext uri="{BB962C8B-B14F-4D97-AF65-F5344CB8AC3E}">
+        <p14:creationId xmlns:p14="http://schemas.microsoft.com/office/powerpoint/2010/main" val="4022824451"/>
+      </p:ext>
+    </p:extLst>
+  </p:cSld>
+  <p:clrMapOvr>
+    <a:masterClrMapping/>
+  </p:clrMapOvr>
+</p:sld>
+</file>
+
+<file path=ppt/slides/slide45.xml><?xml version="1.0" encoding="utf-8"?>
+<p:sld xmlns:a="http://schemas.openxmlformats.org/drawingml/2006/main" xmlns:r="http://schemas.openxmlformats.org/officeDocument/2006/relationships" xmlns:p="http://schemas.openxmlformats.org/presentationml/2006/main">
+  <p:cSld>
+    <p:spTree>
+      <p:nvGrpSpPr>
+        <p:cNvPr id="1" name=""/>
+        <p:cNvGrpSpPr/>
+        <p:nvPr/>
+      </p:nvGrpSpPr>
+      <p:grpSpPr>
+        <a:xfrm>
+          <a:off x="0" y="0"/>
+          <a:ext cx="0" cy="0"/>
+          <a:chOff x="0" y="0"/>
+          <a:chExt cx="0" cy="0"/>
+        </a:xfrm>
+      </p:grpSpPr>
+      <p:sp>
+        <p:nvSpPr>
+          <p:cNvPr id="2" name="标题 1"/>
+          <p:cNvSpPr>
+            <a:spLocks noGrp="1"/>
+          </p:cNvSpPr>
+          <p:nvPr>
+            <p:ph type="title"/>
+          </p:nvPr>
+        </p:nvSpPr>
+        <p:spPr/>
+        <p:txBody>
+          <a:bodyPr/>
+          <a:lstStyle/>
+          <a:p>
+            <a:r>
+              <a:rPr lang="en-US" altLang="zh-CN" dirty="0" smtClean="0"/>
+              <a:t>4.6 </a:t>
+            </a:r>
+            <a:r>
+              <a:rPr lang="zh-CN" altLang="zh-CN" b="1" dirty="0"/>
+              <a:t>课后练习</a:t>
+            </a:r>
+            <a:endParaRPr lang="zh-CN" altLang="en-US" dirty="0"/>
+          </a:p>
+        </p:txBody>
+      </p:sp>
+      <p:sp>
+        <p:nvSpPr>
+          <p:cNvPr id="3" name="内容占位符 2"/>
+          <p:cNvSpPr>
+            <a:spLocks noGrp="1"/>
+          </p:cNvSpPr>
+          <p:nvPr>
+            <p:ph idx="1"/>
+          </p:nvPr>
+        </p:nvSpPr>
+        <p:spPr/>
+        <p:txBody>
+          <a:bodyPr>
+            <a:normAutofit fontScale="55000" lnSpcReduction="20000"/>
+          </a:bodyPr>
+          <a:lstStyle/>
+          <a:p>
+            <a:r>
+              <a:rPr lang="zh-CN" altLang="en-US" dirty="0"/>
+              <a:t>基本函数调用</a:t>
+            </a:r>
+            <a:endParaRPr lang="en-US" altLang="zh-CN" dirty="0" smtClean="0"/>
+          </a:p>
+          <a:p>
+            <a:pPr marL="0" indent="0">
+              <a:buNone/>
+            </a:pPr>
+            <a:r>
+              <a:rPr lang="en-US" altLang="zh-CN" dirty="0" smtClean="0"/>
+              <a:t>	</a:t>
+            </a:r>
+            <a:r>
+              <a:rPr lang="zh-CN" altLang="en-US" dirty="0" smtClean="0"/>
+              <a:t>编写</a:t>
+            </a:r>
+            <a:r>
+              <a:rPr lang="zh-CN" altLang="en-US" dirty="0"/>
+              <a:t>一个函数 </a:t>
+            </a:r>
+            <a:r>
+              <a:rPr lang="en-US" altLang="zh-CN" dirty="0" err="1"/>
+              <a:t>maxValue</a:t>
+            </a:r>
+            <a:r>
+              <a:rPr lang="en-US" altLang="zh-CN" dirty="0"/>
+              <a:t>(</a:t>
+            </a:r>
+            <a:r>
+              <a:rPr lang="en-US" altLang="zh-CN" dirty="0" err="1"/>
+              <a:t>int</a:t>
+            </a:r>
+            <a:r>
+              <a:rPr lang="en-US" altLang="zh-CN" dirty="0"/>
+              <a:t> a, </a:t>
+            </a:r>
+            <a:r>
+              <a:rPr lang="en-US" altLang="zh-CN" dirty="0" err="1"/>
+              <a:t>int</a:t>
+            </a:r>
+            <a:r>
+              <a:rPr lang="en-US" altLang="zh-CN" dirty="0"/>
+              <a:t> b)</a:t>
+            </a:r>
+            <a:r>
+              <a:rPr lang="zh-CN" altLang="en-US" dirty="0"/>
+              <a:t>，返回两个整数中的较大值，并在 </a:t>
+            </a:r>
+            <a:r>
+              <a:rPr lang="en-US" altLang="zh-CN" dirty="0"/>
+              <a:t>main </a:t>
+            </a:r>
+            <a:r>
+              <a:rPr lang="zh-CN" altLang="en-US" dirty="0"/>
+              <a:t>函数中测试。</a:t>
+            </a:r>
+          </a:p>
+          <a:p>
+            <a:r>
+              <a:rPr lang="zh-CN" altLang="en-US" dirty="0"/>
+              <a:t>值传递与引用传递</a:t>
+            </a:r>
+          </a:p>
+          <a:p>
+            <a:pPr marL="0" indent="0">
+              <a:buNone/>
+            </a:pPr>
+            <a:r>
+              <a:rPr lang="en-US" altLang="zh-CN" dirty="0" smtClean="0"/>
+              <a:t>	</a:t>
+            </a:r>
+            <a:r>
+              <a:rPr lang="zh-CN" altLang="en-US" dirty="0" smtClean="0"/>
+              <a:t>编写</a:t>
+            </a:r>
+            <a:r>
+              <a:rPr lang="zh-CN" altLang="en-US" dirty="0"/>
+              <a:t>一个函数 </a:t>
+            </a:r>
+            <a:r>
+              <a:rPr lang="en-US" altLang="zh-CN" dirty="0"/>
+              <a:t>swap(</a:t>
+            </a:r>
+            <a:r>
+              <a:rPr lang="en-US" altLang="zh-CN" dirty="0" err="1"/>
+              <a:t>int</a:t>
+            </a:r>
+            <a:r>
+              <a:rPr lang="en-US" altLang="zh-CN" dirty="0"/>
+              <a:t>&amp; a, </a:t>
+            </a:r>
+            <a:r>
+              <a:rPr lang="en-US" altLang="zh-CN" dirty="0" err="1"/>
+              <a:t>int</a:t>
+            </a:r>
+            <a:r>
+              <a:rPr lang="en-US" altLang="zh-CN" dirty="0"/>
+              <a:t>&amp; b)</a:t>
+            </a:r>
+            <a:r>
+              <a:rPr lang="zh-CN" altLang="en-US" dirty="0"/>
+              <a:t>，交换两个整数的值，并在 </a:t>
+            </a:r>
+            <a:r>
+              <a:rPr lang="en-US" altLang="zh-CN" dirty="0"/>
+              <a:t>main </a:t>
+            </a:r>
+            <a:r>
+              <a:rPr lang="zh-CN" altLang="en-US" dirty="0"/>
+              <a:t>函数中测试。</a:t>
+            </a:r>
+          </a:p>
+          <a:p>
+            <a:r>
+              <a:rPr lang="zh-CN" altLang="en-US" dirty="0"/>
+              <a:t>递归函数</a:t>
+            </a:r>
+          </a:p>
+          <a:p>
+            <a:pPr marL="0" indent="0">
+              <a:buNone/>
+            </a:pPr>
+            <a:r>
+              <a:rPr lang="en-US" altLang="zh-CN" dirty="0" smtClean="0"/>
+              <a:t>	</a:t>
+            </a:r>
+            <a:r>
+              <a:rPr lang="zh-CN" altLang="en-US" dirty="0" smtClean="0"/>
+              <a:t>编写</a:t>
+            </a:r>
+            <a:r>
+              <a:rPr lang="zh-CN" altLang="en-US" dirty="0"/>
+              <a:t>一个递归函数 </a:t>
+            </a:r>
+            <a:r>
+              <a:rPr lang="en-US" altLang="zh-CN" dirty="0" err="1"/>
+              <a:t>int</a:t>
+            </a:r>
+            <a:r>
+              <a:rPr lang="en-US" altLang="zh-CN" dirty="0"/>
+              <a:t> </a:t>
+            </a:r>
+            <a:r>
+              <a:rPr lang="en-US" altLang="zh-CN" dirty="0" err="1"/>
+              <a:t>fibonacci</a:t>
+            </a:r>
+            <a:r>
+              <a:rPr lang="en-US" altLang="zh-CN" dirty="0"/>
+              <a:t>(</a:t>
+            </a:r>
+            <a:r>
+              <a:rPr lang="en-US" altLang="zh-CN" dirty="0" err="1"/>
+              <a:t>int</a:t>
+            </a:r>
+            <a:r>
+              <a:rPr lang="en-US" altLang="zh-CN" dirty="0"/>
+              <a:t> n)</a:t>
+            </a:r>
+            <a:r>
+              <a:rPr lang="zh-CN" altLang="en-US" dirty="0"/>
+              <a:t>，计算并返回斐波那契数列的第 </a:t>
+            </a:r>
+            <a:r>
+              <a:rPr lang="en-US" altLang="zh-CN" dirty="0"/>
+              <a:t>n </a:t>
+            </a:r>
+            <a:r>
+              <a:rPr lang="zh-CN" altLang="en-US" dirty="0"/>
+              <a:t>项。（</a:t>
+            </a:r>
+            <a:r>
+              <a:rPr lang="en-US" altLang="zh-CN" dirty="0"/>
+              <a:t>F(0) = 0, F(1) = 1, F(n) = F(n-1) + F(n-2)</a:t>
+            </a:r>
+            <a:r>
+              <a:rPr lang="zh-CN" altLang="en-US" dirty="0"/>
+              <a:t>）</a:t>
+            </a:r>
+          </a:p>
+          <a:p>
+            <a:pPr marL="0" indent="0">
+              <a:buNone/>
+            </a:pPr>
+            <a:r>
+              <a:rPr lang="en-US" altLang="zh-CN" dirty="0" smtClean="0"/>
+              <a:t>	</a:t>
+            </a:r>
+            <a:r>
+              <a:rPr lang="zh-CN" altLang="en-US" dirty="0" smtClean="0"/>
+              <a:t>编写</a:t>
+            </a:r>
+            <a:r>
+              <a:rPr lang="zh-CN" altLang="en-US" dirty="0"/>
+              <a:t>一个函数 </a:t>
+            </a:r>
+            <a:r>
+              <a:rPr lang="en-US" altLang="zh-CN" dirty="0" err="1"/>
+              <a:t>int</a:t>
+            </a:r>
+            <a:r>
+              <a:rPr lang="en-US" altLang="zh-CN" dirty="0"/>
+              <a:t> </a:t>
+            </a:r>
+            <a:r>
+              <a:rPr lang="en-US" altLang="zh-CN" dirty="0" err="1"/>
+              <a:t>sumArray</a:t>
+            </a:r>
+            <a:r>
+              <a:rPr lang="en-US" altLang="zh-CN" dirty="0"/>
+              <a:t>(</a:t>
+            </a:r>
+            <a:r>
+              <a:rPr lang="en-US" altLang="zh-CN" dirty="0" err="1"/>
+              <a:t>int</a:t>
+            </a:r>
+            <a:r>
+              <a:rPr lang="en-US" altLang="zh-CN" dirty="0"/>
+              <a:t> </a:t>
+            </a:r>
+            <a:r>
+              <a:rPr lang="en-US" altLang="zh-CN" dirty="0" err="1"/>
+              <a:t>arr</a:t>
+            </a:r>
+            <a:r>
+              <a:rPr lang="en-US" altLang="zh-CN" dirty="0"/>
+              <a:t>[], </a:t>
+            </a:r>
+            <a:r>
+              <a:rPr lang="en-US" altLang="zh-CN" dirty="0" err="1"/>
+              <a:t>int</a:t>
+            </a:r>
+            <a:r>
+              <a:rPr lang="en-US" altLang="zh-CN" dirty="0"/>
+              <a:t> size)</a:t>
+            </a:r>
+            <a:r>
+              <a:rPr lang="zh-CN" altLang="en-US" dirty="0"/>
+              <a:t>，计算并返回数组元素的总和。在 </a:t>
+            </a:r>
+            <a:r>
+              <a:rPr lang="en-US" altLang="zh-CN" dirty="0"/>
+              <a:t>main </a:t>
+            </a:r>
+            <a:r>
+              <a:rPr lang="zh-CN" altLang="en-US" dirty="0"/>
+              <a:t>函数中测试该函数。</a:t>
+            </a:r>
+          </a:p>
+          <a:p>
+            <a:r>
+              <a:rPr lang="zh-CN" altLang="en-US" dirty="0"/>
+              <a:t>数组最大值</a:t>
+            </a:r>
+          </a:p>
+          <a:p>
+            <a:pPr marL="0" indent="0">
+              <a:buNone/>
+            </a:pPr>
+            <a:r>
+              <a:rPr lang="en-US" altLang="zh-CN" dirty="0" smtClean="0"/>
+              <a:t>	</a:t>
+            </a:r>
+            <a:r>
+              <a:rPr lang="zh-CN" altLang="en-US" dirty="0" smtClean="0"/>
+              <a:t>编写</a:t>
+            </a:r>
+            <a:r>
+              <a:rPr lang="zh-CN" altLang="en-US" dirty="0"/>
+              <a:t>一个函数 </a:t>
+            </a:r>
+            <a:r>
+              <a:rPr lang="en-US" altLang="zh-CN" dirty="0" err="1"/>
+              <a:t>int</a:t>
+            </a:r>
+            <a:r>
+              <a:rPr lang="en-US" altLang="zh-CN" dirty="0"/>
+              <a:t> </a:t>
+            </a:r>
+            <a:r>
+              <a:rPr lang="en-US" altLang="zh-CN" dirty="0" err="1"/>
+              <a:t>maxInArray</a:t>
+            </a:r>
+            <a:r>
+              <a:rPr lang="en-US" altLang="zh-CN" dirty="0"/>
+              <a:t>(</a:t>
+            </a:r>
+            <a:r>
+              <a:rPr lang="en-US" altLang="zh-CN" dirty="0" err="1"/>
+              <a:t>int</a:t>
+            </a:r>
+            <a:r>
+              <a:rPr lang="en-US" altLang="zh-CN" dirty="0"/>
+              <a:t> </a:t>
+            </a:r>
+            <a:r>
+              <a:rPr lang="en-US" altLang="zh-CN" dirty="0" err="1"/>
+              <a:t>arr</a:t>
+            </a:r>
+            <a:r>
+              <a:rPr lang="en-US" altLang="zh-CN" dirty="0"/>
+              <a:t>[], </a:t>
+            </a:r>
+            <a:r>
+              <a:rPr lang="en-US" altLang="zh-CN" dirty="0" err="1"/>
+              <a:t>int</a:t>
+            </a:r>
+            <a:r>
+              <a:rPr lang="en-US" altLang="zh-CN" dirty="0"/>
+              <a:t> size)</a:t>
+            </a:r>
+            <a:r>
+              <a:rPr lang="zh-CN" altLang="en-US" dirty="0"/>
+              <a:t>，返回数组中的最大值，并在 </a:t>
+            </a:r>
+            <a:r>
+              <a:rPr lang="en-US" altLang="zh-CN" dirty="0"/>
+              <a:t>main </a:t>
+            </a:r>
+            <a:r>
+              <a:rPr lang="zh-CN" altLang="en-US" dirty="0"/>
+              <a:t>函数中测试。</a:t>
+            </a:r>
+          </a:p>
+          <a:p>
+            <a:r>
+              <a:rPr lang="zh-CN" altLang="en-US" dirty="0"/>
+              <a:t>二维数组遍历</a:t>
+            </a:r>
+          </a:p>
+          <a:p>
+            <a:pPr marL="0" indent="0">
+              <a:buNone/>
+            </a:pPr>
+            <a:r>
+              <a:rPr lang="en-US" altLang="zh-CN" dirty="0" smtClean="0"/>
+              <a:t>	</a:t>
+            </a:r>
+            <a:r>
+              <a:rPr lang="zh-CN" altLang="en-US" dirty="0" smtClean="0"/>
+              <a:t>定义</a:t>
+            </a:r>
+            <a:r>
+              <a:rPr lang="zh-CN" altLang="en-US" dirty="0"/>
+              <a:t>一个 </a:t>
+            </a:r>
+            <a:r>
+              <a:rPr lang="en-US" altLang="zh-CN" dirty="0"/>
+              <a:t>3×3 </a:t>
+            </a:r>
+            <a:r>
+              <a:rPr lang="zh-CN" altLang="en-US" dirty="0"/>
+              <a:t>的二维数组，并使用嵌套 </a:t>
+            </a:r>
+            <a:r>
+              <a:rPr lang="en-US" altLang="zh-CN" dirty="0"/>
+              <a:t>for </a:t>
+            </a:r>
+            <a:r>
+              <a:rPr lang="zh-CN" altLang="en-US" dirty="0"/>
+              <a:t>循环输出所有元素。</a:t>
+            </a:r>
+          </a:p>
+          <a:p>
+            <a:r>
+              <a:rPr lang="zh-CN" altLang="en-US" dirty="0"/>
+              <a:t>数组与指针</a:t>
+            </a:r>
+          </a:p>
+          <a:p>
+            <a:pPr marL="0" indent="0">
+              <a:buNone/>
+            </a:pPr>
+            <a:r>
+              <a:rPr lang="en-US" altLang="zh-CN" dirty="0" smtClean="0"/>
+              <a:t>	</a:t>
+            </a:r>
+            <a:r>
+              <a:rPr lang="zh-CN" altLang="en-US" dirty="0" smtClean="0"/>
+              <a:t>编写</a:t>
+            </a:r>
+            <a:r>
+              <a:rPr lang="zh-CN" altLang="en-US" dirty="0"/>
+              <a:t>一个函数 </a:t>
+            </a:r>
+            <a:r>
+              <a:rPr lang="en-US" altLang="zh-CN" dirty="0"/>
+              <a:t>void </a:t>
+            </a:r>
+            <a:r>
+              <a:rPr lang="en-US" altLang="zh-CN" dirty="0" err="1"/>
+              <a:t>printArray</a:t>
+            </a:r>
+            <a:r>
+              <a:rPr lang="en-US" altLang="zh-CN" dirty="0"/>
+              <a:t>(</a:t>
+            </a:r>
+            <a:r>
+              <a:rPr lang="en-US" altLang="zh-CN" dirty="0" err="1"/>
+              <a:t>int</a:t>
+            </a:r>
+            <a:r>
+              <a:rPr lang="en-US" altLang="zh-CN" dirty="0"/>
+              <a:t>* </a:t>
+            </a:r>
+            <a:r>
+              <a:rPr lang="en-US" altLang="zh-CN" dirty="0" err="1"/>
+              <a:t>arr</a:t>
+            </a:r>
+            <a:r>
+              <a:rPr lang="en-US" altLang="zh-CN" dirty="0"/>
+              <a:t>, </a:t>
+            </a:r>
+            <a:r>
+              <a:rPr lang="en-US" altLang="zh-CN" dirty="0" err="1"/>
+              <a:t>int</a:t>
+            </a:r>
+            <a:r>
+              <a:rPr lang="en-US" altLang="zh-CN" dirty="0"/>
+              <a:t> size)</a:t>
+            </a:r>
+            <a:r>
+              <a:rPr lang="zh-CN" altLang="en-US" dirty="0"/>
+              <a:t>，使用指针遍历并输出数组中的所有元素。</a:t>
+            </a:r>
+          </a:p>
+          <a:p>
+            <a:r>
+              <a:rPr lang="zh-CN" altLang="en-US" dirty="0"/>
+              <a:t>数组元素查找</a:t>
+            </a:r>
+          </a:p>
+          <a:p>
+            <a:pPr marL="0" indent="0">
+              <a:buNone/>
+            </a:pPr>
+            <a:r>
+              <a:rPr lang="en-US" altLang="zh-CN" dirty="0" smtClean="0"/>
+              <a:t>	</a:t>
+            </a:r>
+            <a:r>
+              <a:rPr lang="zh-CN" altLang="en-US" dirty="0" smtClean="0"/>
+              <a:t>编写</a:t>
+            </a:r>
+            <a:r>
+              <a:rPr lang="zh-CN" altLang="en-US" dirty="0"/>
+              <a:t>一个函数 </a:t>
+            </a:r>
+            <a:r>
+              <a:rPr lang="en-US" altLang="zh-CN" dirty="0" err="1"/>
+              <a:t>int</a:t>
+            </a:r>
+            <a:r>
+              <a:rPr lang="en-US" altLang="zh-CN" dirty="0"/>
+              <a:t> </a:t>
+            </a:r>
+            <a:r>
+              <a:rPr lang="en-US" altLang="zh-CN" dirty="0" err="1"/>
+              <a:t>findElement</a:t>
+            </a:r>
+            <a:r>
+              <a:rPr lang="en-US" altLang="zh-CN" dirty="0"/>
+              <a:t>(</a:t>
+            </a:r>
+            <a:r>
+              <a:rPr lang="en-US" altLang="zh-CN" dirty="0" err="1"/>
+              <a:t>int</a:t>
+            </a:r>
+            <a:r>
+              <a:rPr lang="en-US" altLang="zh-CN" dirty="0"/>
+              <a:t> </a:t>
+            </a:r>
+            <a:r>
+              <a:rPr lang="en-US" altLang="zh-CN" dirty="0" err="1"/>
+              <a:t>arr</a:t>
+            </a:r>
+            <a:r>
+              <a:rPr lang="en-US" altLang="zh-CN" dirty="0"/>
+              <a:t>[], </a:t>
+            </a:r>
+            <a:r>
+              <a:rPr lang="en-US" altLang="zh-CN" dirty="0" err="1"/>
+              <a:t>int</a:t>
+            </a:r>
+            <a:r>
+              <a:rPr lang="en-US" altLang="zh-CN" dirty="0"/>
+              <a:t> size, </a:t>
+            </a:r>
+            <a:r>
+              <a:rPr lang="en-US" altLang="zh-CN" dirty="0" err="1"/>
+              <a:t>int</a:t>
+            </a:r>
+            <a:r>
+              <a:rPr lang="en-US" altLang="zh-CN" dirty="0"/>
+              <a:t> key)</a:t>
+            </a:r>
+            <a:r>
+              <a:rPr lang="zh-CN" altLang="en-US" dirty="0"/>
+              <a:t>，如果 </a:t>
+            </a:r>
+            <a:r>
+              <a:rPr lang="en-US" altLang="zh-CN" dirty="0"/>
+              <a:t>key </a:t>
+            </a:r>
+            <a:r>
+              <a:rPr lang="zh-CN" altLang="en-US" dirty="0"/>
+              <a:t>存在于数组中，则返回索引，否则返回 </a:t>
+            </a:r>
+            <a:r>
+              <a:rPr lang="en-US" altLang="zh-CN" dirty="0"/>
+              <a:t>-1</a:t>
+            </a:r>
+            <a:r>
+              <a:rPr lang="zh-CN" altLang="en-US" dirty="0"/>
+              <a:t>。</a:t>
+            </a:r>
+          </a:p>
+        </p:txBody>
+      </p:sp>
+    </p:spTree>
+    <p:extLst>
+      <p:ext uri="{BB962C8B-B14F-4D97-AF65-F5344CB8AC3E}">
+        <p14:creationId xmlns:p14="http://schemas.microsoft.com/office/powerpoint/2010/main" val="271248110"/>
+      </p:ext>
+    </p:extLst>
+  </p:cSld>
+  <p:clrMapOvr>
+    <a:masterClrMapping/>
+  </p:clrMapOvr>
+</p:sld>
+</file>
+
+<file path=ppt/slides/slide46.xml><?xml version="1.0" encoding="utf-8"?>
+<p:sld xmlns:a="http://schemas.openxmlformats.org/drawingml/2006/main" xmlns:r="http://schemas.openxmlformats.org/officeDocument/2006/relationships" xmlns:p="http://schemas.openxmlformats.org/presentationml/2006/main">
+  <p:cSld>
+    <p:spTree>
+      <p:nvGrpSpPr>
+        <p:cNvPr id="1" name=""/>
+        <p:cNvGrpSpPr/>
+        <p:nvPr/>
+      </p:nvGrpSpPr>
+      <p:grpSpPr>
+        <a:xfrm>
+          <a:off x="0" y="0"/>
+          <a:ext cx="0" cy="0"/>
+          <a:chOff x="0" y="0"/>
+          <a:chExt cx="0" cy="0"/>
+        </a:xfrm>
+      </p:grpSpPr>
+      <p:sp>
+        <p:nvSpPr>
+          <p:cNvPr id="2" name="标题 1"/>
+          <p:cNvSpPr>
+            <a:spLocks noGrp="1"/>
+          </p:cNvSpPr>
+          <p:nvPr>
+            <p:ph type="title"/>
+          </p:nvPr>
+        </p:nvSpPr>
+        <p:spPr/>
+        <p:txBody>
+          <a:bodyPr/>
+          <a:lstStyle/>
+          <a:p>
+            <a:r>
+              <a:rPr lang="zh-CN" altLang="en-US" b="1" dirty="0" smtClean="0">
+                <a:latin typeface="华文楷体" pitchFamily="2" charset="-122"/>
+                <a:ea typeface="华文楷体" pitchFamily="2" charset="-122"/>
+              </a:rPr>
+              <a:t>第</a:t>
+            </a:r>
+            <a:r>
+              <a:rPr lang="en-US" altLang="zh-CN" b="1" dirty="0" smtClean="0">
+                <a:latin typeface="华文楷体" pitchFamily="2" charset="-122"/>
+                <a:ea typeface="华文楷体" pitchFamily="2" charset="-122"/>
+              </a:rPr>
+              <a:t>5</a:t>
+            </a:r>
+            <a:r>
+              <a:rPr lang="zh-CN" altLang="en-US" b="1" dirty="0" smtClean="0">
+                <a:latin typeface="华文楷体" pitchFamily="2" charset="-122"/>
+                <a:ea typeface="华文楷体" pitchFamily="2" charset="-122"/>
+              </a:rPr>
+              <a:t>章</a:t>
+            </a:r>
+            <a:r>
+              <a:rPr lang="zh-CN" altLang="en-US" b="1" dirty="0">
+                <a:latin typeface="华文楷体" pitchFamily="2" charset="-122"/>
+                <a:ea typeface="华文楷体" pitchFamily="2" charset="-122"/>
+              </a:rPr>
+              <a:t>面向对象编程（</a:t>
+            </a:r>
+            <a:r>
+              <a:rPr lang="en-US" altLang="zh-CN" b="1" dirty="0">
+                <a:latin typeface="华文楷体" pitchFamily="2" charset="-122"/>
+                <a:ea typeface="华文楷体" pitchFamily="2" charset="-122"/>
+              </a:rPr>
+              <a:t>OOP</a:t>
+            </a:r>
+            <a:r>
+              <a:rPr lang="zh-CN" altLang="en-US" b="1" dirty="0">
+                <a:latin typeface="华文楷体" pitchFamily="2" charset="-122"/>
+                <a:ea typeface="华文楷体" pitchFamily="2" charset="-122"/>
+              </a:rPr>
+              <a:t>）基础</a:t>
+            </a:r>
+            <a:endParaRPr lang="zh-CN" altLang="en-US" dirty="0"/>
+          </a:p>
+        </p:txBody>
+      </p:sp>
+      <p:sp>
+        <p:nvSpPr>
+          <p:cNvPr id="3" name="内容占位符 2"/>
+          <p:cNvSpPr>
+            <a:spLocks noGrp="1"/>
+          </p:cNvSpPr>
+          <p:nvPr>
+            <p:ph idx="1"/>
+          </p:nvPr>
+        </p:nvSpPr>
+        <p:spPr/>
+        <p:txBody>
+          <a:bodyPr/>
+          <a:lstStyle/>
+          <a:p>
+            <a:r>
+              <a:rPr lang="zh-CN" altLang="en-US" dirty="0"/>
+              <a:t>类与对象：定义类、创建对象、构造函数与析构函数。</a:t>
+            </a:r>
+          </a:p>
+          <a:p>
+            <a:r>
+              <a:rPr lang="zh-CN" altLang="en-US" dirty="0"/>
+              <a:t>封装：访问控制修饰符（</a:t>
+            </a:r>
+            <a:r>
+              <a:rPr lang="en-US" altLang="zh-CN" dirty="0"/>
+              <a:t>public</a:t>
+            </a:r>
+            <a:r>
+              <a:rPr lang="zh-CN" altLang="en-US" dirty="0"/>
+              <a:t>、</a:t>
+            </a:r>
+            <a:r>
+              <a:rPr lang="en-US" altLang="zh-CN" dirty="0"/>
+              <a:t>private</a:t>
+            </a:r>
+            <a:r>
+              <a:rPr lang="zh-CN" altLang="en-US" dirty="0"/>
+              <a:t>、</a:t>
+            </a:r>
+            <a:r>
+              <a:rPr lang="en-US" altLang="zh-CN" dirty="0"/>
+              <a:t>protected</a:t>
+            </a:r>
+            <a:r>
+              <a:rPr lang="zh-CN" altLang="en-US" dirty="0"/>
+              <a:t>）。</a:t>
+            </a:r>
+          </a:p>
+          <a:p>
+            <a:r>
+              <a:rPr lang="zh-CN" altLang="en-US" dirty="0"/>
+              <a:t>继承：继承的概念、基类与派生类、多重继承。</a:t>
+            </a:r>
+          </a:p>
+          <a:p>
+            <a:r>
+              <a:rPr lang="zh-CN" altLang="en-US" dirty="0"/>
+              <a:t>多态：虚函数、纯虚函数、虚函数的重写、运行时多态。</a:t>
+            </a:r>
+          </a:p>
+        </p:txBody>
+      </p:sp>
+    </p:spTree>
+    <p:extLst>
+      <p:ext uri="{BB962C8B-B14F-4D97-AF65-F5344CB8AC3E}">
+        <p14:creationId xmlns:p14="http://schemas.microsoft.com/office/powerpoint/2010/main" val="2413468171"/>
+      </p:ext>
+    </p:extLst>
+  </p:cSld>
+  <p:clrMapOvr>
+    <a:masterClrMapping/>
+  </p:clrMapOvr>
+  <p:timing>
+    <p:tnLst>
+      <p:par>
+        <p:cTn id="1" dur="indefinite" restart="never" nodeType="tmRoot"/>
+      </p:par>
+    </p:tnLst>
+  </p:timing>
+</p:sld>
+</file>
+
+<file path=ppt/slides/slide47.xml><?xml version="1.0" encoding="utf-8"?>
+<p:sld xmlns:a="http://schemas.openxmlformats.org/drawingml/2006/main" xmlns:r="http://schemas.openxmlformats.org/officeDocument/2006/relationships" xmlns:p="http://schemas.openxmlformats.org/presentationml/2006/main">
+  <p:cSld>
+    <p:spTree>
+      <p:nvGrpSpPr>
+        <p:cNvPr id="1" name=""/>
+        <p:cNvGrpSpPr/>
+        <p:nvPr/>
+      </p:nvGrpSpPr>
+      <p:grpSpPr>
+        <a:xfrm>
+          <a:off x="0" y="0"/>
+          <a:ext cx="0" cy="0"/>
+          <a:chOff x="0" y="0"/>
+          <a:chExt cx="0" cy="0"/>
+        </a:xfrm>
+      </p:grpSpPr>
+      <p:sp>
+        <p:nvSpPr>
+          <p:cNvPr id="2" name="标题 1"/>
+          <p:cNvSpPr>
+            <a:spLocks noGrp="1"/>
+          </p:cNvSpPr>
+          <p:nvPr>
+            <p:ph type="title"/>
+          </p:nvPr>
+        </p:nvSpPr>
+        <p:spPr/>
+        <p:txBody>
+          <a:bodyPr/>
+          <a:lstStyle/>
+          <a:p>
+            <a:r>
+              <a:rPr lang="en-US" altLang="zh-CN" b="1" dirty="0" smtClean="0"/>
+              <a:t>5.1 </a:t>
+            </a:r>
+            <a:r>
+              <a:rPr lang="zh-CN" altLang="en-US" b="1" dirty="0"/>
+              <a:t>为什么使用面向对象</a:t>
+            </a:r>
+          </a:p>
+        </p:txBody>
+      </p:sp>
+      <p:sp>
+        <p:nvSpPr>
+          <p:cNvPr id="3" name="内容占位符 2"/>
+          <p:cNvSpPr>
+            <a:spLocks noGrp="1"/>
+          </p:cNvSpPr>
+          <p:nvPr>
+            <p:ph idx="1"/>
+          </p:nvPr>
+        </p:nvSpPr>
+        <p:spPr/>
+        <p:txBody>
+          <a:bodyPr/>
+          <a:lstStyle/>
+          <a:p>
+            <a:r>
+              <a:rPr lang="zh-CN" altLang="en-US" dirty="0"/>
+              <a:t>面向对象编程（</a:t>
+            </a:r>
+            <a:r>
+              <a:rPr lang="en-US" altLang="zh-CN" dirty="0"/>
+              <a:t>OOP</a:t>
+            </a:r>
+            <a:r>
+              <a:rPr lang="zh-CN" altLang="en-US" dirty="0"/>
+              <a:t>）是软件开发中的一种编程范式，它与传统的过程化编程（如</a:t>
+            </a:r>
+            <a:r>
+              <a:rPr lang="en-US" altLang="zh-CN" dirty="0"/>
+              <a:t>C</a:t>
+            </a:r>
+            <a:r>
+              <a:rPr lang="zh-CN" altLang="en-US" dirty="0"/>
+              <a:t>语言）相比，提供了更高的灵活性和可维护性。通过将数据和操作数据的方法封装在一起，</a:t>
+            </a:r>
+            <a:r>
+              <a:rPr lang="en-US" altLang="zh-CN" dirty="0"/>
+              <a:t>OOP</a:t>
+            </a:r>
+            <a:r>
+              <a:rPr lang="zh-CN" altLang="en-US" dirty="0"/>
+              <a:t>可以使代码更加模块化、可扩展和易于维护</a:t>
+            </a:r>
+            <a:r>
+              <a:rPr lang="zh-CN" altLang="en-US" dirty="0" smtClean="0"/>
+              <a:t>。</a:t>
+            </a:r>
+            <a:endParaRPr lang="en-US" altLang="zh-CN" dirty="0" smtClean="0"/>
+          </a:p>
+          <a:p>
+            <a:r>
+              <a:rPr lang="zh-CN" altLang="en-US" dirty="0"/>
+              <a:t>面向对象的</a:t>
+            </a:r>
+            <a:r>
+              <a:rPr lang="zh-CN" altLang="en-US" dirty="0" smtClean="0"/>
+              <a:t>优势</a:t>
+            </a:r>
+            <a:endParaRPr lang="en-US" altLang="zh-CN" dirty="0" smtClean="0"/>
+          </a:p>
+          <a:p>
+            <a:r>
+              <a:rPr lang="zh-CN" altLang="en-US" dirty="0"/>
+              <a:t>与 </a:t>
+            </a:r>
+            <a:r>
+              <a:rPr lang="en-US" altLang="zh-CN" dirty="0"/>
+              <a:t>C </a:t>
+            </a:r>
+            <a:r>
+              <a:rPr lang="zh-CN" altLang="en-US" dirty="0"/>
+              <a:t>语言的</a:t>
+            </a:r>
+            <a:r>
+              <a:rPr lang="zh-CN" altLang="en-US" dirty="0" smtClean="0"/>
+              <a:t>区别</a:t>
+            </a:r>
+            <a:endParaRPr lang="en-US" altLang="zh-CN" dirty="0" smtClean="0"/>
+          </a:p>
+          <a:p>
+            <a:r>
+              <a:rPr lang="zh-CN" altLang="en-US" dirty="0"/>
+              <a:t>为什么选择面向对象编程</a:t>
+            </a:r>
+          </a:p>
+        </p:txBody>
+      </p:sp>
+    </p:spTree>
+    <p:extLst>
+      <p:ext uri="{BB962C8B-B14F-4D97-AF65-F5344CB8AC3E}">
+        <p14:creationId xmlns:p14="http://schemas.microsoft.com/office/powerpoint/2010/main" val="329754630"/>
+      </p:ext>
+    </p:extLst>
+  </p:cSld>
+  <p:clrMapOvr>
+    <a:masterClrMapping/>
+  </p:clrMapOvr>
+</p:sld>
+</file>
+
+<file path=ppt/slides/slide48.xml><?xml version="1.0" encoding="utf-8"?>
+<p:sld xmlns:a="http://schemas.openxmlformats.org/drawingml/2006/main" xmlns:r="http://schemas.openxmlformats.org/officeDocument/2006/relationships" xmlns:p="http://schemas.openxmlformats.org/presentationml/2006/main">
+  <p:cSld>
+    <p:spTree>
+      <p:nvGrpSpPr>
+        <p:cNvPr id="1" name=""/>
+        <p:cNvGrpSpPr/>
+        <p:nvPr/>
+      </p:nvGrpSpPr>
+      <p:grpSpPr>
+        <a:xfrm>
+          <a:off x="0" y="0"/>
+          <a:ext cx="0" cy="0"/>
+          <a:chOff x="0" y="0"/>
+          <a:chExt cx="0" cy="0"/>
+        </a:xfrm>
+      </p:grpSpPr>
+      <p:sp>
+        <p:nvSpPr>
+          <p:cNvPr id="2" name="标题 1"/>
+          <p:cNvSpPr>
+            <a:spLocks noGrp="1"/>
+          </p:cNvSpPr>
+          <p:nvPr>
+            <p:ph type="title"/>
+          </p:nvPr>
+        </p:nvSpPr>
+        <p:spPr/>
+        <p:txBody>
+          <a:bodyPr/>
+          <a:lstStyle/>
+          <a:p>
+            <a:r>
+              <a:rPr lang="zh-CN" altLang="en-US" b="1" dirty="0"/>
+              <a:t>面向对象的优势</a:t>
+            </a:r>
+            <a:r>
+              <a:rPr lang="en-US" altLang="zh-CN" dirty="0"/>
+              <a:t/>
+            </a:r>
+            <a:br>
+              <a:rPr lang="en-US" altLang="zh-CN" dirty="0"/>
+            </a:br>
+            <a:endParaRPr lang="zh-CN" altLang="en-US" dirty="0"/>
+          </a:p>
+        </p:txBody>
+      </p:sp>
+      <p:sp>
+        <p:nvSpPr>
+          <p:cNvPr id="3" name="内容占位符 2"/>
+          <p:cNvSpPr>
+            <a:spLocks noGrp="1"/>
+          </p:cNvSpPr>
+          <p:nvPr>
+            <p:ph idx="1"/>
+          </p:nvPr>
+        </p:nvSpPr>
+        <p:spPr/>
+        <p:txBody>
+          <a:bodyPr/>
+          <a:lstStyle/>
+          <a:p>
+            <a:r>
+              <a:rPr lang="zh-CN" altLang="en-US" dirty="0"/>
+              <a:t>封装：</a:t>
+            </a:r>
+            <a:r>
+              <a:rPr lang="en-US" altLang="zh-CN" dirty="0"/>
+              <a:t>OOP</a:t>
+            </a:r>
+            <a:r>
+              <a:rPr lang="zh-CN" altLang="en-US" dirty="0"/>
+              <a:t>鼓励将数据与数据操作封装在一起，减少数据访问的复杂性。通过封装，类的实现细节可以隐藏，外部代码只需关注接口而非实现。</a:t>
+            </a:r>
+          </a:p>
+          <a:p>
+            <a:r>
+              <a:rPr lang="zh-CN" altLang="en-US" dirty="0"/>
+              <a:t>继承：继承允许类继承另一个类的属性和方法，减少代码的重复，增强代码的重用性。</a:t>
+            </a:r>
+          </a:p>
+          <a:p>
+            <a:r>
+              <a:rPr lang="zh-CN" altLang="en-US" dirty="0"/>
+              <a:t>多态：多态使得同一操作可以在不同类型的对象上表现出不同的行为，提高了代码的灵活性。</a:t>
+            </a:r>
+          </a:p>
+          <a:p>
+            <a:r>
+              <a:rPr lang="zh-CN" altLang="en-US" dirty="0"/>
+              <a:t>模块化与可维护性：</a:t>
+            </a:r>
+            <a:r>
+              <a:rPr lang="en-US" altLang="zh-CN" dirty="0"/>
+              <a:t>OOP</a:t>
+            </a:r>
+            <a:r>
+              <a:rPr lang="zh-CN" altLang="en-US" dirty="0"/>
+              <a:t>允许将一个大程序拆分成多个小模块，每个模块负责自己独立的功能，增强了代码的可维护性和扩展性。</a:t>
+            </a:r>
+          </a:p>
+        </p:txBody>
+      </p:sp>
+    </p:spTree>
+    <p:extLst>
+      <p:ext uri="{BB962C8B-B14F-4D97-AF65-F5344CB8AC3E}">
+        <p14:creationId xmlns:p14="http://schemas.microsoft.com/office/powerpoint/2010/main" val="1941399030"/>
+      </p:ext>
+    </p:extLst>
+  </p:cSld>
+  <p:clrMapOvr>
+    <a:masterClrMapping/>
+  </p:clrMapOvr>
+</p:sld>
+</file>
+
+<file path=ppt/slides/slide49.xml><?xml version="1.0" encoding="utf-8"?>
+<p:sld xmlns:a="http://schemas.openxmlformats.org/drawingml/2006/main" xmlns:r="http://schemas.openxmlformats.org/officeDocument/2006/relationships" xmlns:p="http://schemas.openxmlformats.org/presentationml/2006/main">
+  <p:cSld>
+    <p:spTree>
+      <p:nvGrpSpPr>
+        <p:cNvPr id="1" name=""/>
+        <p:cNvGrpSpPr/>
+        <p:nvPr/>
+      </p:nvGrpSpPr>
+      <p:grpSpPr>
+        <a:xfrm>
+          <a:off x="0" y="0"/>
+          <a:ext cx="0" cy="0"/>
+          <a:chOff x="0" y="0"/>
+          <a:chExt cx="0" cy="0"/>
+        </a:xfrm>
+      </p:grpSpPr>
+      <p:sp>
+        <p:nvSpPr>
+          <p:cNvPr id="2" name="标题 1"/>
+          <p:cNvSpPr>
+            <a:spLocks noGrp="1"/>
+          </p:cNvSpPr>
+          <p:nvPr>
+            <p:ph type="title"/>
+          </p:nvPr>
+        </p:nvSpPr>
+        <p:spPr/>
+        <p:txBody>
+          <a:bodyPr/>
+          <a:lstStyle/>
+          <a:p>
+            <a:r>
               <a:rPr lang="zh-CN" altLang="en-US" b="1" dirty="0"/>
               <a:t>与 </a:t>
             </a:r>
@@ -15285,7 +17134,155 @@
 </p:sld>
 </file>
 
-<file path=ppt/slides/slide42.xml><?xml version="1.0" encoding="utf-8"?>
+<file path=ppt/slides/slide5.xml><?xml version="1.0" encoding="utf-8"?>
+<p:sld xmlns:a="http://schemas.openxmlformats.org/drawingml/2006/main" xmlns:r="http://schemas.openxmlformats.org/officeDocument/2006/relationships" xmlns:p="http://schemas.openxmlformats.org/presentationml/2006/main">
+  <p:cSld>
+    <p:spTree>
+      <p:nvGrpSpPr>
+        <p:cNvPr id="1" name=""/>
+        <p:cNvGrpSpPr/>
+        <p:nvPr/>
+      </p:nvGrpSpPr>
+      <p:grpSpPr>
+        <a:xfrm>
+          <a:off x="0" y="0"/>
+          <a:ext cx="0" cy="0"/>
+          <a:chOff x="0" y="0"/>
+          <a:chExt cx="0" cy="0"/>
+        </a:xfrm>
+      </p:grpSpPr>
+      <p:sp>
+        <p:nvSpPr>
+          <p:cNvPr id="2" name="标题 1"/>
+          <p:cNvSpPr>
+            <a:spLocks noGrp="1"/>
+          </p:cNvSpPr>
+          <p:nvPr>
+            <p:ph type="title"/>
+          </p:nvPr>
+        </p:nvSpPr>
+        <p:spPr/>
+        <p:txBody>
+          <a:bodyPr/>
+          <a:lstStyle/>
+          <a:p>
+            <a:r>
+              <a:rPr lang="zh-CN" altLang="en-US" b="1" dirty="0"/>
+              <a:t>面向对象编程</a:t>
+            </a:r>
+          </a:p>
+        </p:txBody>
+      </p:sp>
+      <p:sp>
+        <p:nvSpPr>
+          <p:cNvPr id="3" name="内容占位符 2"/>
+          <p:cNvSpPr>
+            <a:spLocks noGrp="1"/>
+          </p:cNvSpPr>
+          <p:nvPr>
+            <p:ph idx="1"/>
+          </p:nvPr>
+        </p:nvSpPr>
+        <p:spPr/>
+        <p:txBody>
+          <a:bodyPr/>
+          <a:lstStyle/>
+          <a:p>
+            <a:r>
+              <a:rPr lang="zh-CN" altLang="en-US" b="1" dirty="0"/>
+              <a:t>面向对象编程</a:t>
+            </a:r>
+            <a:r>
+              <a:rPr lang="zh-CN" altLang="en-US" dirty="0"/>
+              <a:t>（</a:t>
+            </a:r>
+            <a:r>
+              <a:rPr lang="en-US" altLang="zh-CN" dirty="0"/>
+              <a:t>Object-Oriented Programming</a:t>
+            </a:r>
+            <a:r>
+              <a:rPr lang="zh-CN" altLang="en-US" dirty="0"/>
+              <a:t>）是一种将数据和对数据的操作结合在一起，封装成对象的编程范式。每个对象都有自己的数据和操作这些数据的方法。</a:t>
+            </a:r>
+            <a:r>
+              <a:rPr lang="en-US" altLang="zh-CN" dirty="0"/>
+              <a:t>OOP</a:t>
+            </a:r>
+            <a:r>
+              <a:rPr lang="zh-CN" altLang="en-US" dirty="0"/>
+              <a:t>强调通过类和对象来组织程序，以便实现更高效的代码复用和更好的模块化设计。</a:t>
+            </a:r>
+          </a:p>
+          <a:p>
+            <a:pPr lvl="1"/>
+            <a:r>
+              <a:rPr lang="zh-CN" altLang="en-US" b="1" dirty="0"/>
+              <a:t>设计理念：</a:t>
+            </a:r>
+            <a:r>
+              <a:rPr lang="zh-CN" altLang="en-US" dirty="0"/>
+              <a:t> 强调“做什么”的问题，通过定义类来封装数据和行为（即“什么做什么”），更关注系统的行为。</a:t>
+            </a:r>
+          </a:p>
+          <a:p>
+            <a:pPr lvl="1"/>
+            <a:r>
+              <a:rPr lang="zh-CN" altLang="en-US" b="1" dirty="0"/>
+              <a:t>程序结构：</a:t>
+            </a:r>
+            <a:r>
+              <a:rPr lang="zh-CN" altLang="en-US" dirty="0"/>
+              <a:t> 程序的核心是类和对象。类是对现实世界的抽象，类中既包含数据（成员变量），也包含操作数据的行为（成员方法）。</a:t>
+            </a:r>
+          </a:p>
+          <a:p>
+            <a:pPr lvl="1"/>
+            <a:r>
+              <a:rPr lang="zh-CN" altLang="en-US" b="1" dirty="0"/>
+              <a:t>优点：</a:t>
+            </a:r>
+            <a:r>
+              <a:rPr lang="zh-CN" altLang="en-US" dirty="0"/>
+              <a:t> 代码重用性高，易于扩展，具有更好的模块化和维护性。</a:t>
+            </a:r>
+          </a:p>
+          <a:p>
+            <a:pPr lvl="1"/>
+            <a:r>
+              <a:rPr lang="zh-CN" altLang="en-US" b="1" dirty="0"/>
+              <a:t>缺点：</a:t>
+            </a:r>
+            <a:r>
+              <a:rPr lang="zh-CN" altLang="en-US" dirty="0"/>
+              <a:t> 对比面向过程，初学者可能会觉得更加复杂。</a:t>
+            </a:r>
+          </a:p>
+          <a:p>
+            <a:endParaRPr lang="zh-CN" altLang="en-US" dirty="0"/>
+          </a:p>
+        </p:txBody>
+      </p:sp>
+    </p:spTree>
+    <p:extLst>
+      <p:ext uri="{BB962C8B-B14F-4D97-AF65-F5344CB8AC3E}">
+        <p14:creationId xmlns:p14="http://schemas.microsoft.com/office/powerpoint/2010/main" val="870103892"/>
+      </p:ext>
+    </p:extLst>
+  </p:cSld>
+  <p:clrMapOvr>
+    <a:masterClrMapping/>
+  </p:clrMapOvr>
+  <p:timing>
+    <p:tnLst>
+      <p:par>
+        <p:cTn id="1" dur="indefinite" restart="never" nodeType="tmRoot"/>
+      </p:par>
+    </p:tnLst>
+  </p:timing>
+</p:sld>
+</file>
+
+<file path=ppt/slides/slide50.xml><?xml version="1.0" encoding="utf-8"?>
 <p:sld xmlns:a="http://schemas.openxmlformats.org/drawingml/2006/main" xmlns:r="http://schemas.openxmlformats.org/officeDocument/2006/relationships" xmlns:p="http://schemas.openxmlformats.org/presentationml/2006/main">
   <p:cSld>
     <p:spTree>
@@ -15712,7 +17709,7 @@
 </p:sld>
 </file>
 
-<file path=ppt/slides/slide43.xml><?xml version="1.0" encoding="utf-8"?>
+<file path=ppt/slides/slide51.xml><?xml version="1.0" encoding="utf-8"?>
 <p:sld xmlns:a="http://schemas.openxmlformats.org/drawingml/2006/main" xmlns:r="http://schemas.openxmlformats.org/officeDocument/2006/relationships" xmlns:p="http://schemas.openxmlformats.org/presentationml/2006/main">
   <p:cSld>
     <p:spTree>
@@ -15882,7 +17879,7 @@
 </p:sld>
 </file>
 
-<file path=ppt/slides/slide44.xml><?xml version="1.0" encoding="utf-8"?>
+<file path=ppt/slides/slide52.xml><?xml version="1.0" encoding="utf-8"?>
 <p:sld xmlns:a="http://schemas.openxmlformats.org/drawingml/2006/main" xmlns:r="http://schemas.openxmlformats.org/officeDocument/2006/relationships" xmlns:p="http://schemas.openxmlformats.org/presentationml/2006/main">
   <p:cSld>
     <p:spTree>
@@ -16028,7 +18025,7 @@
 </p:sld>
 </file>
 
-<file path=ppt/slides/slide45.xml><?xml version="1.0" encoding="utf-8"?>
+<file path=ppt/slides/slide53.xml><?xml version="1.0" encoding="utf-8"?>
 <p:sld xmlns:a="http://schemas.openxmlformats.org/drawingml/2006/main" xmlns:r="http://schemas.openxmlformats.org/officeDocument/2006/relationships" xmlns:p="http://schemas.openxmlformats.org/presentationml/2006/main">
   <p:cSld>
     <p:spTree>
@@ -16172,7 +18169,7 @@
 </p:sld>
 </file>
 
-<file path=ppt/slides/slide46.xml><?xml version="1.0" encoding="utf-8"?>
+<file path=ppt/slides/slide54.xml><?xml version="1.0" encoding="utf-8"?>
 <p:sld xmlns:a="http://schemas.openxmlformats.org/drawingml/2006/main" xmlns:r="http://schemas.openxmlformats.org/officeDocument/2006/relationships" xmlns:p="http://schemas.openxmlformats.org/presentationml/2006/main">
   <p:cSld>
     <p:spTree>
@@ -16365,7 +18362,7 @@
 </p:sld>
 </file>
 
-<file path=ppt/slides/slide47.xml><?xml version="1.0" encoding="utf-8"?>
+<file path=ppt/slides/slide55.xml><?xml version="1.0" encoding="utf-8"?>
 <p:sld xmlns:a="http://schemas.openxmlformats.org/drawingml/2006/main" xmlns:r="http://schemas.openxmlformats.org/officeDocument/2006/relationships" xmlns:p="http://schemas.openxmlformats.org/presentationml/2006/main">
   <p:cSld>
     <p:spTree>
@@ -16485,7 +18482,7 @@
 </p:sld>
 </file>
 
-<file path=ppt/slides/slide48.xml><?xml version="1.0" encoding="utf-8"?>
+<file path=ppt/slides/slide56.xml><?xml version="1.0" encoding="utf-8"?>
 <p:sld xmlns:a="http://schemas.openxmlformats.org/drawingml/2006/main" xmlns:r="http://schemas.openxmlformats.org/officeDocument/2006/relationships" xmlns:p="http://schemas.openxmlformats.org/presentationml/2006/main">
   <p:cSld>
     <p:spTree>
@@ -16642,7 +18639,7 @@
 </p:sld>
 </file>
 
-<file path=ppt/slides/slide49.xml><?xml version="1.0" encoding="utf-8"?>
+<file path=ppt/slides/slide57.xml><?xml version="1.0" encoding="utf-8"?>
 <p:sld xmlns:a="http://schemas.openxmlformats.org/drawingml/2006/main" xmlns:r="http://schemas.openxmlformats.org/officeDocument/2006/relationships" xmlns:p="http://schemas.openxmlformats.org/presentationml/2006/main">
   <p:cSld>
     <p:spTree>
@@ -16855,155 +18852,7 @@
 </p:sld>
 </file>
 
-<file path=ppt/slides/slide5.xml><?xml version="1.0" encoding="utf-8"?>
-<p:sld xmlns:a="http://schemas.openxmlformats.org/drawingml/2006/main" xmlns:r="http://schemas.openxmlformats.org/officeDocument/2006/relationships" xmlns:p="http://schemas.openxmlformats.org/presentationml/2006/main">
-  <p:cSld>
-    <p:spTree>
-      <p:nvGrpSpPr>
-        <p:cNvPr id="1" name=""/>
-        <p:cNvGrpSpPr/>
-        <p:nvPr/>
-      </p:nvGrpSpPr>
-      <p:grpSpPr>
-        <a:xfrm>
-          <a:off x="0" y="0"/>
-          <a:ext cx="0" cy="0"/>
-          <a:chOff x="0" y="0"/>
-          <a:chExt cx="0" cy="0"/>
-        </a:xfrm>
-      </p:grpSpPr>
-      <p:sp>
-        <p:nvSpPr>
-          <p:cNvPr id="2" name="标题 1"/>
-          <p:cNvSpPr>
-            <a:spLocks noGrp="1"/>
-          </p:cNvSpPr>
-          <p:nvPr>
-            <p:ph type="title"/>
-          </p:nvPr>
-        </p:nvSpPr>
-        <p:spPr/>
-        <p:txBody>
-          <a:bodyPr/>
-          <a:lstStyle/>
-          <a:p>
-            <a:r>
-              <a:rPr lang="zh-CN" altLang="en-US" b="1" dirty="0"/>
-              <a:t>面向对象编程</a:t>
-            </a:r>
-          </a:p>
-        </p:txBody>
-      </p:sp>
-      <p:sp>
-        <p:nvSpPr>
-          <p:cNvPr id="3" name="内容占位符 2"/>
-          <p:cNvSpPr>
-            <a:spLocks noGrp="1"/>
-          </p:cNvSpPr>
-          <p:nvPr>
-            <p:ph idx="1"/>
-          </p:nvPr>
-        </p:nvSpPr>
-        <p:spPr/>
-        <p:txBody>
-          <a:bodyPr/>
-          <a:lstStyle/>
-          <a:p>
-            <a:r>
-              <a:rPr lang="zh-CN" altLang="en-US" b="1" dirty="0"/>
-              <a:t>面向对象编程</a:t>
-            </a:r>
-            <a:r>
-              <a:rPr lang="zh-CN" altLang="en-US" dirty="0"/>
-              <a:t>（</a:t>
-            </a:r>
-            <a:r>
-              <a:rPr lang="en-US" altLang="zh-CN" dirty="0"/>
-              <a:t>Object-Oriented Programming</a:t>
-            </a:r>
-            <a:r>
-              <a:rPr lang="zh-CN" altLang="en-US" dirty="0"/>
-              <a:t>）是一种将数据和对数据的操作结合在一起，封装成对象的编程范式。每个对象都有自己的数据和操作这些数据的方法。</a:t>
-            </a:r>
-            <a:r>
-              <a:rPr lang="en-US" altLang="zh-CN" dirty="0"/>
-              <a:t>OOP</a:t>
-            </a:r>
-            <a:r>
-              <a:rPr lang="zh-CN" altLang="en-US" dirty="0"/>
-              <a:t>强调通过类和对象来组织程序，以便实现更高效的代码复用和更好的模块化设计。</a:t>
-            </a:r>
-          </a:p>
-          <a:p>
-            <a:pPr lvl="1"/>
-            <a:r>
-              <a:rPr lang="zh-CN" altLang="en-US" b="1" dirty="0"/>
-              <a:t>设计理念：</a:t>
-            </a:r>
-            <a:r>
-              <a:rPr lang="zh-CN" altLang="en-US" dirty="0"/>
-              <a:t> 强调“做什么”的问题，通过定义类来封装数据和行为（即“什么做什么”），更关注系统的行为。</a:t>
-            </a:r>
-          </a:p>
-          <a:p>
-            <a:pPr lvl="1"/>
-            <a:r>
-              <a:rPr lang="zh-CN" altLang="en-US" b="1" dirty="0"/>
-              <a:t>程序结构：</a:t>
-            </a:r>
-            <a:r>
-              <a:rPr lang="zh-CN" altLang="en-US" dirty="0"/>
-              <a:t> 程序的核心是类和对象。类是对现实世界的抽象，类中既包含数据（成员变量），也包含操作数据的行为（成员方法）。</a:t>
-            </a:r>
-          </a:p>
-          <a:p>
-            <a:pPr lvl="1"/>
-            <a:r>
-              <a:rPr lang="zh-CN" altLang="en-US" b="1" dirty="0"/>
-              <a:t>优点：</a:t>
-            </a:r>
-            <a:r>
-              <a:rPr lang="zh-CN" altLang="en-US" dirty="0"/>
-              <a:t> 代码重用性高，易于扩展，具有更好的模块化和维护性。</a:t>
-            </a:r>
-          </a:p>
-          <a:p>
-            <a:pPr lvl="1"/>
-            <a:r>
-              <a:rPr lang="zh-CN" altLang="en-US" b="1" dirty="0"/>
-              <a:t>缺点：</a:t>
-            </a:r>
-            <a:r>
-              <a:rPr lang="zh-CN" altLang="en-US" dirty="0"/>
-              <a:t> 对比面向过程，初学者可能会觉得更加复杂。</a:t>
-            </a:r>
-          </a:p>
-          <a:p>
-            <a:endParaRPr lang="zh-CN" altLang="en-US" dirty="0"/>
-          </a:p>
-        </p:txBody>
-      </p:sp>
-    </p:spTree>
-    <p:extLst>
-      <p:ext uri="{BB962C8B-B14F-4D97-AF65-F5344CB8AC3E}">
-        <p14:creationId xmlns:p14="http://schemas.microsoft.com/office/powerpoint/2010/main" val="870103892"/>
-      </p:ext>
-    </p:extLst>
-  </p:cSld>
-  <p:clrMapOvr>
-    <a:masterClrMapping/>
-  </p:clrMapOvr>
-  <p:timing>
-    <p:tnLst>
-      <p:par>
-        <p:cTn id="1" dur="indefinite" restart="never" nodeType="tmRoot"/>
-      </p:par>
-    </p:tnLst>
-  </p:timing>
-</p:sld>
-</file>
-
-<file path=ppt/slides/slide50.xml><?xml version="1.0" encoding="utf-8"?>
+<file path=ppt/slides/slide58.xml><?xml version="1.0" encoding="utf-8"?>
 <p:sld xmlns:a="http://schemas.openxmlformats.org/drawingml/2006/main" xmlns:r="http://schemas.openxmlformats.org/officeDocument/2006/relationships" xmlns:p="http://schemas.openxmlformats.org/presentationml/2006/main">
   <p:cSld>
     <p:spTree>
@@ -17131,7 +18980,7 @@
 </p:sld>
 </file>
 
-<file path=ppt/slides/slide51.xml><?xml version="1.0" encoding="utf-8"?>
+<file path=ppt/slides/slide59.xml><?xml version="1.0" encoding="utf-8"?>
 <p:sld xmlns:a="http://schemas.openxmlformats.org/drawingml/2006/main" xmlns:r="http://schemas.openxmlformats.org/officeDocument/2006/relationships" xmlns:p="http://schemas.openxmlformats.org/presentationml/2006/main">
   <p:cSld>
     <p:spTree>
@@ -17273,687 +19122,6 @@
     <p:extLst>
       <p:ext uri="{BB962C8B-B14F-4D97-AF65-F5344CB8AC3E}">
         <p14:creationId xmlns:p14="http://schemas.microsoft.com/office/powerpoint/2010/main" val="2309702231"/>
-      </p:ext>
-    </p:extLst>
-  </p:cSld>
-  <p:clrMapOvr>
-    <a:masterClrMapping/>
-  </p:clrMapOvr>
-  <p:timing>
-    <p:tnLst>
-      <p:par>
-        <p:cTn id="1" dur="indefinite" restart="never" nodeType="tmRoot"/>
-      </p:par>
-    </p:tnLst>
-  </p:timing>
-</p:sld>
-</file>
-
-<file path=ppt/slides/slide52.xml><?xml version="1.0" encoding="utf-8"?>
-<p:sld xmlns:a="http://schemas.openxmlformats.org/drawingml/2006/main" xmlns:r="http://schemas.openxmlformats.org/officeDocument/2006/relationships" xmlns:p="http://schemas.openxmlformats.org/presentationml/2006/main">
-  <p:cSld>
-    <p:spTree>
-      <p:nvGrpSpPr>
-        <p:cNvPr id="1" name=""/>
-        <p:cNvGrpSpPr/>
-        <p:nvPr/>
-      </p:nvGrpSpPr>
-      <p:grpSpPr>
-        <a:xfrm>
-          <a:off x="0" y="0"/>
-          <a:ext cx="0" cy="0"/>
-          <a:chOff x="0" y="0"/>
-          <a:chExt cx="0" cy="0"/>
-        </a:xfrm>
-      </p:grpSpPr>
-      <p:sp>
-        <p:nvSpPr>
-          <p:cNvPr id="2" name="标题 1"/>
-          <p:cNvSpPr>
-            <a:spLocks noGrp="1"/>
-          </p:cNvSpPr>
-          <p:nvPr>
-            <p:ph type="title"/>
-          </p:nvPr>
-        </p:nvSpPr>
-        <p:spPr/>
-        <p:txBody>
-          <a:bodyPr/>
-          <a:lstStyle/>
-          <a:p>
-            <a:r>
-              <a:rPr lang="zh-CN" altLang="en-US" b="1" dirty="0" smtClean="0">
-                <a:latin typeface="华文楷体" pitchFamily="2" charset="-122"/>
-                <a:ea typeface="华文楷体" pitchFamily="2" charset="-122"/>
-              </a:rPr>
-              <a:t>第</a:t>
-            </a:r>
-            <a:r>
-              <a:rPr lang="en-US" altLang="zh-CN" b="1" dirty="0" smtClean="0">
-                <a:latin typeface="华文楷体" pitchFamily="2" charset="-122"/>
-                <a:ea typeface="华文楷体" pitchFamily="2" charset="-122"/>
-              </a:rPr>
-              <a:t>10</a:t>
-            </a:r>
-            <a:r>
-              <a:rPr lang="zh-CN" altLang="en-US" b="1" dirty="0" smtClean="0">
-                <a:latin typeface="华文楷体" pitchFamily="2" charset="-122"/>
-                <a:ea typeface="华文楷体" pitchFamily="2" charset="-122"/>
-              </a:rPr>
-              <a:t>章  </a:t>
-            </a:r>
-            <a:r>
-              <a:rPr lang="en-US" altLang="zh-CN" b="1" dirty="0">
-                <a:latin typeface="华文楷体" pitchFamily="2" charset="-122"/>
-                <a:ea typeface="华文楷体" pitchFamily="2" charset="-122"/>
-              </a:rPr>
-              <a:t>C++11</a:t>
-            </a:r>
-            <a:r>
-              <a:rPr lang="zh-CN" altLang="en-US" b="1" dirty="0">
-                <a:latin typeface="华文楷体" pitchFamily="2" charset="-122"/>
-                <a:ea typeface="华文楷体" pitchFamily="2" charset="-122"/>
-              </a:rPr>
-              <a:t>及以后特性</a:t>
-            </a:r>
-            <a:endParaRPr lang="zh-CN" altLang="en-US" dirty="0"/>
-          </a:p>
-        </p:txBody>
-      </p:sp>
-      <p:sp>
-        <p:nvSpPr>
-          <p:cNvPr id="3" name="内容占位符 2"/>
-          <p:cNvSpPr>
-            <a:spLocks noGrp="1"/>
-          </p:cNvSpPr>
-          <p:nvPr>
-            <p:ph idx="1"/>
-          </p:nvPr>
-        </p:nvSpPr>
-        <p:spPr/>
-        <p:txBody>
-          <a:bodyPr/>
-          <a:lstStyle/>
-          <a:p>
-            <a:r>
-              <a:rPr lang="en-US" altLang="zh-CN" dirty="0"/>
-              <a:t>Lambda</a:t>
-            </a:r>
-            <a:r>
-              <a:rPr lang="zh-CN" altLang="en-US" dirty="0"/>
-              <a:t>表达式：如何使用</a:t>
-            </a:r>
-            <a:r>
-              <a:rPr lang="en-US" altLang="zh-CN" dirty="0"/>
-              <a:t>Lambda</a:t>
-            </a:r>
-            <a:r>
-              <a:rPr lang="zh-CN" altLang="en-US" dirty="0"/>
-              <a:t>简化代码。</a:t>
-            </a:r>
-          </a:p>
-          <a:p>
-            <a:r>
-              <a:rPr lang="zh-CN" altLang="en-US" dirty="0"/>
-              <a:t>智能指针：如何使用</a:t>
-            </a:r>
-            <a:r>
-              <a:rPr lang="en-US" altLang="zh-CN" dirty="0" err="1"/>
-              <a:t>shared_ptr</a:t>
-            </a:r>
-            <a:r>
-              <a:rPr lang="zh-CN" altLang="en-US" dirty="0"/>
-              <a:t>、</a:t>
-            </a:r>
-            <a:r>
-              <a:rPr lang="en-US" altLang="zh-CN" dirty="0" err="1"/>
-              <a:t>unique_ptr</a:t>
-            </a:r>
-            <a:r>
-              <a:rPr lang="zh-CN" altLang="en-US" dirty="0"/>
-              <a:t>等智能指针管理内存。</a:t>
-            </a:r>
-          </a:p>
-          <a:p>
-            <a:r>
-              <a:rPr lang="zh-CN" altLang="en-US" dirty="0"/>
-              <a:t>线程与并发：</a:t>
-            </a:r>
-            <a:r>
-              <a:rPr lang="en-US" altLang="zh-CN" dirty="0" err="1"/>
-              <a:t>std</a:t>
-            </a:r>
-            <a:r>
-              <a:rPr lang="en-US" altLang="zh-CN" dirty="0"/>
-              <a:t>::thread</a:t>
-            </a:r>
-            <a:r>
-              <a:rPr lang="zh-CN" altLang="en-US" dirty="0"/>
-              <a:t>、</a:t>
-            </a:r>
-            <a:r>
-              <a:rPr lang="en-US" altLang="zh-CN" dirty="0" err="1"/>
-              <a:t>std</a:t>
-            </a:r>
-            <a:r>
-              <a:rPr lang="en-US" altLang="zh-CN" dirty="0"/>
-              <a:t>::</a:t>
-            </a:r>
-            <a:r>
-              <a:rPr lang="en-US" altLang="zh-CN" dirty="0" err="1"/>
-              <a:t>mutex</a:t>
-            </a:r>
-            <a:r>
-              <a:rPr lang="zh-CN" altLang="en-US" dirty="0"/>
-              <a:t>、</a:t>
-            </a:r>
-            <a:r>
-              <a:rPr lang="en-US" altLang="zh-CN" dirty="0" err="1"/>
-              <a:t>std</a:t>
-            </a:r>
-            <a:r>
-              <a:rPr lang="en-US" altLang="zh-CN" dirty="0"/>
-              <a:t>::</a:t>
-            </a:r>
-            <a:r>
-              <a:rPr lang="en-US" altLang="zh-CN" dirty="0" err="1"/>
-              <a:t>async</a:t>
-            </a:r>
-            <a:r>
-              <a:rPr lang="zh-CN" altLang="en-US" dirty="0"/>
-              <a:t>等并发编程工具。</a:t>
-            </a:r>
-          </a:p>
-          <a:p>
-            <a:r>
-              <a:rPr lang="zh-CN" altLang="en-US" dirty="0"/>
-              <a:t>右值引用与移动语义：</a:t>
-            </a:r>
-            <a:r>
-              <a:rPr lang="en-US" altLang="zh-CN" dirty="0" err="1"/>
-              <a:t>std</a:t>
-            </a:r>
-            <a:r>
-              <a:rPr lang="en-US" altLang="zh-CN" dirty="0"/>
-              <a:t>::move</a:t>
-            </a:r>
-            <a:r>
-              <a:rPr lang="zh-CN" altLang="en-US" dirty="0"/>
-              <a:t>、</a:t>
-            </a:r>
-            <a:r>
-              <a:rPr lang="en-US" altLang="zh-CN" dirty="0" err="1"/>
-              <a:t>std</a:t>
-            </a:r>
-            <a:r>
-              <a:rPr lang="en-US" altLang="zh-CN" dirty="0"/>
-              <a:t>::forward</a:t>
-            </a:r>
-            <a:r>
-              <a:rPr lang="zh-CN" altLang="en-US" dirty="0"/>
-              <a:t>、移动构造函数和移动赋值运算符。</a:t>
-            </a:r>
-          </a:p>
-          <a:p>
-            <a:r>
-              <a:rPr lang="en-US" altLang="zh-CN" dirty="0" err="1"/>
-              <a:t>std</a:t>
-            </a:r>
-            <a:r>
-              <a:rPr lang="en-US" altLang="zh-CN" dirty="0"/>
-              <a:t>::</a:t>
-            </a:r>
-            <a:r>
-              <a:rPr lang="en-US" altLang="zh-CN" dirty="0" err="1"/>
-              <a:t>chrono</a:t>
-            </a:r>
-            <a:r>
-              <a:rPr lang="zh-CN" altLang="en-US" dirty="0"/>
-              <a:t>库：时间测量和延时功能。</a:t>
-            </a:r>
-          </a:p>
-        </p:txBody>
-      </p:sp>
-    </p:spTree>
-    <p:extLst>
-      <p:ext uri="{BB962C8B-B14F-4D97-AF65-F5344CB8AC3E}">
-        <p14:creationId xmlns:p14="http://schemas.microsoft.com/office/powerpoint/2010/main" val="1295629135"/>
-      </p:ext>
-    </p:extLst>
-  </p:cSld>
-  <p:clrMapOvr>
-    <a:masterClrMapping/>
-  </p:clrMapOvr>
-  <p:timing>
-    <p:tnLst>
-      <p:par>
-        <p:cTn id="1" dur="indefinite" restart="never" nodeType="tmRoot"/>
-      </p:par>
-    </p:tnLst>
-  </p:timing>
-</p:sld>
-</file>
-
-<file path=ppt/slides/slide53.xml><?xml version="1.0" encoding="utf-8"?>
-<p:sld xmlns:a="http://schemas.openxmlformats.org/drawingml/2006/main" xmlns:r="http://schemas.openxmlformats.org/officeDocument/2006/relationships" xmlns:p="http://schemas.openxmlformats.org/presentationml/2006/main">
-  <p:cSld>
-    <p:spTree>
-      <p:nvGrpSpPr>
-        <p:cNvPr id="1" name=""/>
-        <p:cNvGrpSpPr/>
-        <p:nvPr/>
-      </p:nvGrpSpPr>
-      <p:grpSpPr>
-        <a:xfrm>
-          <a:off x="0" y="0"/>
-          <a:ext cx="0" cy="0"/>
-          <a:chOff x="0" y="0"/>
-          <a:chExt cx="0" cy="0"/>
-        </a:xfrm>
-      </p:grpSpPr>
-      <p:sp>
-        <p:nvSpPr>
-          <p:cNvPr id="2" name="标题 1"/>
-          <p:cNvSpPr>
-            <a:spLocks noGrp="1"/>
-          </p:cNvSpPr>
-          <p:nvPr>
-            <p:ph type="title"/>
-          </p:nvPr>
-        </p:nvSpPr>
-        <p:spPr/>
-        <p:txBody>
-          <a:bodyPr/>
-          <a:lstStyle/>
-          <a:p>
-            <a:r>
-              <a:rPr lang="zh-CN" altLang="en-US" b="1" dirty="0">
-                <a:latin typeface="华文楷体" pitchFamily="2" charset="-122"/>
-                <a:ea typeface="华文楷体" pitchFamily="2" charset="-122"/>
-              </a:rPr>
-              <a:t>第</a:t>
-            </a:r>
-            <a:r>
-              <a:rPr lang="en-US" altLang="zh-CN" b="1" dirty="0" smtClean="0">
-                <a:latin typeface="华文楷体" pitchFamily="2" charset="-122"/>
-                <a:ea typeface="华文楷体" pitchFamily="2" charset="-122"/>
-              </a:rPr>
-              <a:t>11</a:t>
-            </a:r>
-            <a:r>
-              <a:rPr lang="zh-CN" altLang="en-US" b="1" dirty="0" smtClean="0">
-                <a:latin typeface="华文楷体" pitchFamily="2" charset="-122"/>
-                <a:ea typeface="华文楷体" pitchFamily="2" charset="-122"/>
-              </a:rPr>
-              <a:t>章  </a:t>
-            </a:r>
-            <a:r>
-              <a:rPr lang="en-US" altLang="zh-CN" b="1" dirty="0">
-                <a:latin typeface="华文楷体" pitchFamily="2" charset="-122"/>
-                <a:ea typeface="华文楷体" pitchFamily="2" charset="-122"/>
-              </a:rPr>
-              <a:t>C++</a:t>
-            </a:r>
-            <a:r>
-              <a:rPr lang="zh-CN" altLang="en-US" b="1" dirty="0">
-                <a:latin typeface="华文楷体" pitchFamily="2" charset="-122"/>
-                <a:ea typeface="华文楷体" pitchFamily="2" charset="-122"/>
-              </a:rPr>
-              <a:t>设计模式</a:t>
-            </a:r>
-            <a:endParaRPr lang="zh-CN" altLang="en-US" dirty="0"/>
-          </a:p>
-        </p:txBody>
-      </p:sp>
-      <p:sp>
-        <p:nvSpPr>
-          <p:cNvPr id="3" name="内容占位符 2"/>
-          <p:cNvSpPr>
-            <a:spLocks noGrp="1"/>
-          </p:cNvSpPr>
-          <p:nvPr>
-            <p:ph idx="1"/>
-          </p:nvPr>
-        </p:nvSpPr>
-        <p:spPr/>
-        <p:txBody>
-          <a:bodyPr/>
-          <a:lstStyle/>
-          <a:p>
-            <a:r>
-              <a:rPr lang="zh-CN" altLang="en-US" dirty="0"/>
-              <a:t>单例模式：如何实现和应用单例模式。</a:t>
-            </a:r>
-          </a:p>
-          <a:p>
-            <a:r>
-              <a:rPr lang="zh-CN" altLang="en-US" dirty="0"/>
-              <a:t>工厂模式：使用工厂模式来创建对象。</a:t>
-            </a:r>
-          </a:p>
-          <a:p>
-            <a:r>
-              <a:rPr lang="zh-CN" altLang="en-US" dirty="0"/>
-              <a:t>观察者模式：如何实现和应用观察者模式。</a:t>
-            </a:r>
-          </a:p>
-          <a:p>
-            <a:r>
-              <a:rPr lang="zh-CN" altLang="en-US" dirty="0"/>
-              <a:t>策略模式：定义一系列算法，将每一个算法封装起来</a:t>
-            </a:r>
-            <a:r>
-              <a:rPr lang="zh-CN" altLang="en-US" dirty="0" smtClean="0"/>
-              <a:t>。</a:t>
-            </a:r>
-            <a:endParaRPr lang="en-US" altLang="zh-CN" dirty="0" smtClean="0"/>
-          </a:p>
-          <a:p>
-            <a:r>
-              <a:rPr lang="zh-CN" altLang="en-US"/>
-              <a:t>高内</a:t>
-            </a:r>
-            <a:r>
-              <a:rPr lang="zh-CN" altLang="en-US" smtClean="0"/>
-              <a:t>聚，低耦合</a:t>
-            </a:r>
-            <a:endParaRPr lang="zh-CN" altLang="en-US" dirty="0"/>
-          </a:p>
-        </p:txBody>
-      </p:sp>
-    </p:spTree>
-    <p:extLst>
-      <p:ext uri="{BB962C8B-B14F-4D97-AF65-F5344CB8AC3E}">
-        <p14:creationId xmlns:p14="http://schemas.microsoft.com/office/powerpoint/2010/main" val="4116617042"/>
-      </p:ext>
-    </p:extLst>
-  </p:cSld>
-  <p:clrMapOvr>
-    <a:masterClrMapping/>
-  </p:clrMapOvr>
-  <p:timing>
-    <p:tnLst>
-      <p:par>
-        <p:cTn id="1" dur="indefinite" restart="never" nodeType="tmRoot"/>
-      </p:par>
-    </p:tnLst>
-  </p:timing>
-</p:sld>
-</file>
-
-<file path=ppt/slides/slide54.xml><?xml version="1.0" encoding="utf-8"?>
-<p:sld xmlns:a="http://schemas.openxmlformats.org/drawingml/2006/main" xmlns:r="http://schemas.openxmlformats.org/officeDocument/2006/relationships" xmlns:p="http://schemas.openxmlformats.org/presentationml/2006/main">
-  <p:cSld>
-    <p:spTree>
-      <p:nvGrpSpPr>
-        <p:cNvPr id="1" name=""/>
-        <p:cNvGrpSpPr/>
-        <p:nvPr/>
-      </p:nvGrpSpPr>
-      <p:grpSpPr>
-        <a:xfrm>
-          <a:off x="0" y="0"/>
-          <a:ext cx="0" cy="0"/>
-          <a:chOff x="0" y="0"/>
-          <a:chExt cx="0" cy="0"/>
-        </a:xfrm>
-      </p:grpSpPr>
-      <p:sp>
-        <p:nvSpPr>
-          <p:cNvPr id="2" name="标题 1"/>
-          <p:cNvSpPr>
-            <a:spLocks noGrp="1"/>
-          </p:cNvSpPr>
-          <p:nvPr>
-            <p:ph type="title"/>
-          </p:nvPr>
-        </p:nvSpPr>
-        <p:spPr/>
-        <p:txBody>
-          <a:bodyPr/>
-          <a:lstStyle/>
-          <a:p>
-            <a:r>
-              <a:rPr lang="zh-CN" altLang="en-US" b="1" dirty="0">
-                <a:latin typeface="华文楷体" pitchFamily="2" charset="-122"/>
-                <a:ea typeface="华文楷体" pitchFamily="2" charset="-122"/>
-              </a:rPr>
-              <a:t>第</a:t>
-            </a:r>
-            <a:r>
-              <a:rPr lang="en-US" altLang="zh-CN" b="1" dirty="0" smtClean="0">
-                <a:latin typeface="华文楷体" pitchFamily="2" charset="-122"/>
-                <a:ea typeface="华文楷体" pitchFamily="2" charset="-122"/>
-              </a:rPr>
-              <a:t>11</a:t>
-            </a:r>
-            <a:r>
-              <a:rPr lang="zh-CN" altLang="en-US" b="1" dirty="0" smtClean="0">
-                <a:latin typeface="华文楷体" pitchFamily="2" charset="-122"/>
-                <a:ea typeface="华文楷体" pitchFamily="2" charset="-122"/>
-              </a:rPr>
-              <a:t>章  </a:t>
-            </a:r>
-            <a:r>
-              <a:rPr lang="en-US" altLang="zh-CN" b="1" dirty="0">
-                <a:latin typeface="华文楷体" pitchFamily="2" charset="-122"/>
-                <a:ea typeface="华文楷体" pitchFamily="2" charset="-122"/>
-              </a:rPr>
-              <a:t>C++</a:t>
-            </a:r>
-            <a:r>
-              <a:rPr lang="zh-CN" altLang="en-US" b="1" dirty="0">
-                <a:latin typeface="华文楷体" pitchFamily="2" charset="-122"/>
-                <a:ea typeface="华文楷体" pitchFamily="2" charset="-122"/>
-              </a:rPr>
-              <a:t>进阶</a:t>
-            </a:r>
-            <a:endParaRPr lang="zh-CN" altLang="en-US" dirty="0"/>
-          </a:p>
-        </p:txBody>
-      </p:sp>
-      <p:sp>
-        <p:nvSpPr>
-          <p:cNvPr id="3" name="内容占位符 2"/>
-          <p:cNvSpPr>
-            <a:spLocks noGrp="1"/>
-          </p:cNvSpPr>
-          <p:nvPr>
-            <p:ph idx="1"/>
-          </p:nvPr>
-        </p:nvSpPr>
-        <p:spPr/>
-        <p:txBody>
-          <a:bodyPr/>
-          <a:lstStyle/>
-          <a:p>
-            <a:r>
-              <a:rPr lang="zh-CN" altLang="en-US" dirty="0"/>
-              <a:t>模板编程：函数模板、类模板、模板特化与偏特化、模板元编程。</a:t>
-            </a:r>
-          </a:p>
-          <a:p>
-            <a:r>
-              <a:rPr lang="en-US" altLang="zh-CN" dirty="0"/>
-              <a:t>C++</a:t>
-            </a:r>
-            <a:r>
-              <a:rPr lang="zh-CN" altLang="en-US" dirty="0"/>
-              <a:t>与</a:t>
-            </a:r>
-            <a:r>
-              <a:rPr lang="en-US" altLang="zh-CN" dirty="0"/>
-              <a:t>C</a:t>
-            </a:r>
-            <a:r>
-              <a:rPr lang="zh-CN" altLang="en-US" dirty="0"/>
-              <a:t>的互操作性：如何在</a:t>
-            </a:r>
-            <a:r>
-              <a:rPr lang="en-US" altLang="zh-CN" dirty="0"/>
-              <a:t>C++</a:t>
-            </a:r>
-            <a:r>
-              <a:rPr lang="zh-CN" altLang="en-US" dirty="0"/>
-              <a:t>中调用</a:t>
-            </a:r>
-            <a:r>
-              <a:rPr lang="en-US" altLang="zh-CN" dirty="0"/>
-              <a:t>C</a:t>
-            </a:r>
-            <a:r>
-              <a:rPr lang="zh-CN" altLang="en-US" dirty="0"/>
-              <a:t>语言代码。</a:t>
-            </a:r>
-          </a:p>
-          <a:p>
-            <a:r>
-              <a:rPr lang="en-US" altLang="zh-CN" dirty="0"/>
-              <a:t>C++</a:t>
-            </a:r>
-            <a:r>
-              <a:rPr lang="zh-CN" altLang="en-US" dirty="0"/>
-              <a:t>与外部库集成：使用外部库（如</a:t>
-            </a:r>
-            <a:r>
-              <a:rPr lang="en-US" altLang="zh-CN" dirty="0"/>
-              <a:t>Boost</a:t>
-            </a:r>
-            <a:r>
-              <a:rPr lang="zh-CN" altLang="en-US" dirty="0"/>
-              <a:t>、</a:t>
-            </a:r>
-            <a:r>
-              <a:rPr lang="en-US" altLang="zh-CN" dirty="0" err="1"/>
-              <a:t>Qt</a:t>
-            </a:r>
-            <a:r>
-              <a:rPr lang="zh-CN" altLang="en-US" dirty="0"/>
-              <a:t>、</a:t>
-            </a:r>
-            <a:r>
-              <a:rPr lang="en-US" altLang="zh-CN" dirty="0" err="1"/>
-              <a:t>OpenCV</a:t>
-            </a:r>
-            <a:r>
-              <a:rPr lang="zh-CN" altLang="en-US" dirty="0"/>
-              <a:t>等）进行开发。</a:t>
-            </a:r>
-          </a:p>
-        </p:txBody>
-      </p:sp>
-    </p:spTree>
-    <p:extLst>
-      <p:ext uri="{BB962C8B-B14F-4D97-AF65-F5344CB8AC3E}">
-        <p14:creationId xmlns:p14="http://schemas.microsoft.com/office/powerpoint/2010/main" val="2783617826"/>
-      </p:ext>
-    </p:extLst>
-  </p:cSld>
-  <p:clrMapOvr>
-    <a:masterClrMapping/>
-  </p:clrMapOvr>
-  <p:timing>
-    <p:tnLst>
-      <p:par>
-        <p:cTn id="1" dur="indefinite" restart="never" nodeType="tmRoot"/>
-      </p:par>
-    </p:tnLst>
-  </p:timing>
-</p:sld>
-</file>
-
-<file path=ppt/slides/slide55.xml><?xml version="1.0" encoding="utf-8"?>
-<p:sld xmlns:a="http://schemas.openxmlformats.org/drawingml/2006/main" xmlns:r="http://schemas.openxmlformats.org/officeDocument/2006/relationships" xmlns:p="http://schemas.openxmlformats.org/presentationml/2006/main">
-  <p:cSld>
-    <p:spTree>
-      <p:nvGrpSpPr>
-        <p:cNvPr id="1" name=""/>
-        <p:cNvGrpSpPr/>
-        <p:nvPr/>
-      </p:nvGrpSpPr>
-      <p:grpSpPr>
-        <a:xfrm>
-          <a:off x="0" y="0"/>
-          <a:ext cx="0" cy="0"/>
-          <a:chOff x="0" y="0"/>
-          <a:chExt cx="0" cy="0"/>
-        </a:xfrm>
-      </p:grpSpPr>
-      <p:sp>
-        <p:nvSpPr>
-          <p:cNvPr id="2" name="标题 1"/>
-          <p:cNvSpPr>
-            <a:spLocks noGrp="1"/>
-          </p:cNvSpPr>
-          <p:nvPr>
-            <p:ph type="title"/>
-          </p:nvPr>
-        </p:nvSpPr>
-        <p:spPr/>
-        <p:txBody>
-          <a:bodyPr/>
-          <a:lstStyle/>
-          <a:p>
-            <a:r>
-              <a:rPr lang="zh-CN" altLang="en-US" b="1" dirty="0">
-                <a:latin typeface="华文楷体" pitchFamily="2" charset="-122"/>
-                <a:ea typeface="华文楷体" pitchFamily="2" charset="-122"/>
-              </a:rPr>
-              <a:t>第</a:t>
-            </a:r>
-            <a:r>
-              <a:rPr lang="en-US" altLang="zh-CN" b="1" dirty="0" smtClean="0">
-                <a:latin typeface="华文楷体" pitchFamily="2" charset="-122"/>
-                <a:ea typeface="华文楷体" pitchFamily="2" charset="-122"/>
-              </a:rPr>
-              <a:t>12</a:t>
-            </a:r>
-            <a:r>
-              <a:rPr lang="zh-CN" altLang="en-US" b="1" smtClean="0">
-                <a:latin typeface="华文楷体" pitchFamily="2" charset="-122"/>
-                <a:ea typeface="华文楷体" pitchFamily="2" charset="-122"/>
-              </a:rPr>
-              <a:t>章  总和练习</a:t>
-            </a:r>
-            <a:endParaRPr lang="zh-CN" altLang="en-US" dirty="0"/>
-          </a:p>
-        </p:txBody>
-      </p:sp>
-      <p:sp>
-        <p:nvSpPr>
-          <p:cNvPr id="3" name="内容占位符 2"/>
-          <p:cNvSpPr>
-            <a:spLocks noGrp="1"/>
-          </p:cNvSpPr>
-          <p:nvPr>
-            <p:ph idx="1"/>
-          </p:nvPr>
-        </p:nvSpPr>
-        <p:spPr/>
-        <p:txBody>
-          <a:bodyPr/>
-          <a:lstStyle/>
-          <a:p>
-            <a:r>
-              <a:rPr lang="en-US" altLang="zh-CN" dirty="0"/>
-              <a:t>1.1 </a:t>
-            </a:r>
-            <a:r>
-              <a:rPr lang="zh-CN" altLang="en-US" dirty="0"/>
-              <a:t>什么是</a:t>
-            </a:r>
-            <a:r>
-              <a:rPr lang="zh-CN" altLang="en-US" dirty="0" smtClean="0"/>
-              <a:t>计算机程序</a:t>
-            </a:r>
-            <a:endParaRPr lang="zh-CN" altLang="en-US" dirty="0"/>
-          </a:p>
-        </p:txBody>
-      </p:sp>
-    </p:spTree>
-    <p:extLst>
-      <p:ext uri="{BB962C8B-B14F-4D97-AF65-F5344CB8AC3E}">
-        <p14:creationId xmlns:p14="http://schemas.microsoft.com/office/powerpoint/2010/main" val="1064233169"/>
       </p:ext>
     </p:extLst>
   </p:cSld>
@@ -18048,6 +19216,687 @@
     <p:extLst>
       <p:ext uri="{BB962C8B-B14F-4D97-AF65-F5344CB8AC3E}">
         <p14:creationId xmlns:p14="http://schemas.microsoft.com/office/powerpoint/2010/main" val="2001259653"/>
+      </p:ext>
+    </p:extLst>
+  </p:cSld>
+  <p:clrMapOvr>
+    <a:masterClrMapping/>
+  </p:clrMapOvr>
+  <p:timing>
+    <p:tnLst>
+      <p:par>
+        <p:cTn id="1" dur="indefinite" restart="never" nodeType="tmRoot"/>
+      </p:par>
+    </p:tnLst>
+  </p:timing>
+</p:sld>
+</file>
+
+<file path=ppt/slides/slide60.xml><?xml version="1.0" encoding="utf-8"?>
+<p:sld xmlns:a="http://schemas.openxmlformats.org/drawingml/2006/main" xmlns:r="http://schemas.openxmlformats.org/officeDocument/2006/relationships" xmlns:p="http://schemas.openxmlformats.org/presentationml/2006/main">
+  <p:cSld>
+    <p:spTree>
+      <p:nvGrpSpPr>
+        <p:cNvPr id="1" name=""/>
+        <p:cNvGrpSpPr/>
+        <p:nvPr/>
+      </p:nvGrpSpPr>
+      <p:grpSpPr>
+        <a:xfrm>
+          <a:off x="0" y="0"/>
+          <a:ext cx="0" cy="0"/>
+          <a:chOff x="0" y="0"/>
+          <a:chExt cx="0" cy="0"/>
+        </a:xfrm>
+      </p:grpSpPr>
+      <p:sp>
+        <p:nvSpPr>
+          <p:cNvPr id="2" name="标题 1"/>
+          <p:cNvSpPr>
+            <a:spLocks noGrp="1"/>
+          </p:cNvSpPr>
+          <p:nvPr>
+            <p:ph type="title"/>
+          </p:nvPr>
+        </p:nvSpPr>
+        <p:spPr/>
+        <p:txBody>
+          <a:bodyPr/>
+          <a:lstStyle/>
+          <a:p>
+            <a:r>
+              <a:rPr lang="zh-CN" altLang="en-US" b="1" dirty="0" smtClean="0">
+                <a:latin typeface="华文楷体" pitchFamily="2" charset="-122"/>
+                <a:ea typeface="华文楷体" pitchFamily="2" charset="-122"/>
+              </a:rPr>
+              <a:t>第</a:t>
+            </a:r>
+            <a:r>
+              <a:rPr lang="en-US" altLang="zh-CN" b="1" dirty="0" smtClean="0">
+                <a:latin typeface="华文楷体" pitchFamily="2" charset="-122"/>
+                <a:ea typeface="华文楷体" pitchFamily="2" charset="-122"/>
+              </a:rPr>
+              <a:t>10</a:t>
+            </a:r>
+            <a:r>
+              <a:rPr lang="zh-CN" altLang="en-US" b="1" dirty="0" smtClean="0">
+                <a:latin typeface="华文楷体" pitchFamily="2" charset="-122"/>
+                <a:ea typeface="华文楷体" pitchFamily="2" charset="-122"/>
+              </a:rPr>
+              <a:t>章  </a:t>
+            </a:r>
+            <a:r>
+              <a:rPr lang="en-US" altLang="zh-CN" b="1" dirty="0">
+                <a:latin typeface="华文楷体" pitchFamily="2" charset="-122"/>
+                <a:ea typeface="华文楷体" pitchFamily="2" charset="-122"/>
+              </a:rPr>
+              <a:t>C++11</a:t>
+            </a:r>
+            <a:r>
+              <a:rPr lang="zh-CN" altLang="en-US" b="1" dirty="0">
+                <a:latin typeface="华文楷体" pitchFamily="2" charset="-122"/>
+                <a:ea typeface="华文楷体" pitchFamily="2" charset="-122"/>
+              </a:rPr>
+              <a:t>及以后特性</a:t>
+            </a:r>
+            <a:endParaRPr lang="zh-CN" altLang="en-US" dirty="0"/>
+          </a:p>
+        </p:txBody>
+      </p:sp>
+      <p:sp>
+        <p:nvSpPr>
+          <p:cNvPr id="3" name="内容占位符 2"/>
+          <p:cNvSpPr>
+            <a:spLocks noGrp="1"/>
+          </p:cNvSpPr>
+          <p:nvPr>
+            <p:ph idx="1"/>
+          </p:nvPr>
+        </p:nvSpPr>
+        <p:spPr/>
+        <p:txBody>
+          <a:bodyPr/>
+          <a:lstStyle/>
+          <a:p>
+            <a:r>
+              <a:rPr lang="en-US" altLang="zh-CN" dirty="0"/>
+              <a:t>Lambda</a:t>
+            </a:r>
+            <a:r>
+              <a:rPr lang="zh-CN" altLang="en-US" dirty="0"/>
+              <a:t>表达式：如何使用</a:t>
+            </a:r>
+            <a:r>
+              <a:rPr lang="en-US" altLang="zh-CN" dirty="0"/>
+              <a:t>Lambda</a:t>
+            </a:r>
+            <a:r>
+              <a:rPr lang="zh-CN" altLang="en-US" dirty="0"/>
+              <a:t>简化代码。</a:t>
+            </a:r>
+          </a:p>
+          <a:p>
+            <a:r>
+              <a:rPr lang="zh-CN" altLang="en-US" dirty="0"/>
+              <a:t>智能指针：如何使用</a:t>
+            </a:r>
+            <a:r>
+              <a:rPr lang="en-US" altLang="zh-CN" dirty="0" err="1"/>
+              <a:t>shared_ptr</a:t>
+            </a:r>
+            <a:r>
+              <a:rPr lang="zh-CN" altLang="en-US" dirty="0"/>
+              <a:t>、</a:t>
+            </a:r>
+            <a:r>
+              <a:rPr lang="en-US" altLang="zh-CN" dirty="0" err="1"/>
+              <a:t>unique_ptr</a:t>
+            </a:r>
+            <a:r>
+              <a:rPr lang="zh-CN" altLang="en-US" dirty="0"/>
+              <a:t>等智能指针管理内存。</a:t>
+            </a:r>
+          </a:p>
+          <a:p>
+            <a:r>
+              <a:rPr lang="zh-CN" altLang="en-US" dirty="0"/>
+              <a:t>线程与并发：</a:t>
+            </a:r>
+            <a:r>
+              <a:rPr lang="en-US" altLang="zh-CN" dirty="0" err="1"/>
+              <a:t>std</a:t>
+            </a:r>
+            <a:r>
+              <a:rPr lang="en-US" altLang="zh-CN" dirty="0"/>
+              <a:t>::thread</a:t>
+            </a:r>
+            <a:r>
+              <a:rPr lang="zh-CN" altLang="en-US" dirty="0"/>
+              <a:t>、</a:t>
+            </a:r>
+            <a:r>
+              <a:rPr lang="en-US" altLang="zh-CN" dirty="0" err="1"/>
+              <a:t>std</a:t>
+            </a:r>
+            <a:r>
+              <a:rPr lang="en-US" altLang="zh-CN" dirty="0"/>
+              <a:t>::</a:t>
+            </a:r>
+            <a:r>
+              <a:rPr lang="en-US" altLang="zh-CN" dirty="0" err="1"/>
+              <a:t>mutex</a:t>
+            </a:r>
+            <a:r>
+              <a:rPr lang="zh-CN" altLang="en-US" dirty="0"/>
+              <a:t>、</a:t>
+            </a:r>
+            <a:r>
+              <a:rPr lang="en-US" altLang="zh-CN" dirty="0" err="1"/>
+              <a:t>std</a:t>
+            </a:r>
+            <a:r>
+              <a:rPr lang="en-US" altLang="zh-CN" dirty="0"/>
+              <a:t>::</a:t>
+            </a:r>
+            <a:r>
+              <a:rPr lang="en-US" altLang="zh-CN" dirty="0" err="1"/>
+              <a:t>async</a:t>
+            </a:r>
+            <a:r>
+              <a:rPr lang="zh-CN" altLang="en-US" dirty="0"/>
+              <a:t>等并发编程工具。</a:t>
+            </a:r>
+          </a:p>
+          <a:p>
+            <a:r>
+              <a:rPr lang="zh-CN" altLang="en-US" dirty="0"/>
+              <a:t>右值引用与移动语义：</a:t>
+            </a:r>
+            <a:r>
+              <a:rPr lang="en-US" altLang="zh-CN" dirty="0" err="1"/>
+              <a:t>std</a:t>
+            </a:r>
+            <a:r>
+              <a:rPr lang="en-US" altLang="zh-CN" dirty="0"/>
+              <a:t>::move</a:t>
+            </a:r>
+            <a:r>
+              <a:rPr lang="zh-CN" altLang="en-US" dirty="0"/>
+              <a:t>、</a:t>
+            </a:r>
+            <a:r>
+              <a:rPr lang="en-US" altLang="zh-CN" dirty="0" err="1"/>
+              <a:t>std</a:t>
+            </a:r>
+            <a:r>
+              <a:rPr lang="en-US" altLang="zh-CN" dirty="0"/>
+              <a:t>::forward</a:t>
+            </a:r>
+            <a:r>
+              <a:rPr lang="zh-CN" altLang="en-US" dirty="0"/>
+              <a:t>、移动构造函数和移动赋值运算符。</a:t>
+            </a:r>
+          </a:p>
+          <a:p>
+            <a:r>
+              <a:rPr lang="en-US" altLang="zh-CN" dirty="0" err="1"/>
+              <a:t>std</a:t>
+            </a:r>
+            <a:r>
+              <a:rPr lang="en-US" altLang="zh-CN" dirty="0"/>
+              <a:t>::</a:t>
+            </a:r>
+            <a:r>
+              <a:rPr lang="en-US" altLang="zh-CN" dirty="0" err="1"/>
+              <a:t>chrono</a:t>
+            </a:r>
+            <a:r>
+              <a:rPr lang="zh-CN" altLang="en-US" dirty="0"/>
+              <a:t>库：时间测量和延时功能。</a:t>
+            </a:r>
+          </a:p>
+        </p:txBody>
+      </p:sp>
+    </p:spTree>
+    <p:extLst>
+      <p:ext uri="{BB962C8B-B14F-4D97-AF65-F5344CB8AC3E}">
+        <p14:creationId xmlns:p14="http://schemas.microsoft.com/office/powerpoint/2010/main" val="1295629135"/>
+      </p:ext>
+    </p:extLst>
+  </p:cSld>
+  <p:clrMapOvr>
+    <a:masterClrMapping/>
+  </p:clrMapOvr>
+  <p:timing>
+    <p:tnLst>
+      <p:par>
+        <p:cTn id="1" dur="indefinite" restart="never" nodeType="tmRoot"/>
+      </p:par>
+    </p:tnLst>
+  </p:timing>
+</p:sld>
+</file>
+
+<file path=ppt/slides/slide61.xml><?xml version="1.0" encoding="utf-8"?>
+<p:sld xmlns:a="http://schemas.openxmlformats.org/drawingml/2006/main" xmlns:r="http://schemas.openxmlformats.org/officeDocument/2006/relationships" xmlns:p="http://schemas.openxmlformats.org/presentationml/2006/main">
+  <p:cSld>
+    <p:spTree>
+      <p:nvGrpSpPr>
+        <p:cNvPr id="1" name=""/>
+        <p:cNvGrpSpPr/>
+        <p:nvPr/>
+      </p:nvGrpSpPr>
+      <p:grpSpPr>
+        <a:xfrm>
+          <a:off x="0" y="0"/>
+          <a:ext cx="0" cy="0"/>
+          <a:chOff x="0" y="0"/>
+          <a:chExt cx="0" cy="0"/>
+        </a:xfrm>
+      </p:grpSpPr>
+      <p:sp>
+        <p:nvSpPr>
+          <p:cNvPr id="2" name="标题 1"/>
+          <p:cNvSpPr>
+            <a:spLocks noGrp="1"/>
+          </p:cNvSpPr>
+          <p:nvPr>
+            <p:ph type="title"/>
+          </p:nvPr>
+        </p:nvSpPr>
+        <p:spPr/>
+        <p:txBody>
+          <a:bodyPr/>
+          <a:lstStyle/>
+          <a:p>
+            <a:r>
+              <a:rPr lang="zh-CN" altLang="en-US" b="1" dirty="0">
+                <a:latin typeface="华文楷体" pitchFamily="2" charset="-122"/>
+                <a:ea typeface="华文楷体" pitchFamily="2" charset="-122"/>
+              </a:rPr>
+              <a:t>第</a:t>
+            </a:r>
+            <a:r>
+              <a:rPr lang="en-US" altLang="zh-CN" b="1" dirty="0" smtClean="0">
+                <a:latin typeface="华文楷体" pitchFamily="2" charset="-122"/>
+                <a:ea typeface="华文楷体" pitchFamily="2" charset="-122"/>
+              </a:rPr>
+              <a:t>11</a:t>
+            </a:r>
+            <a:r>
+              <a:rPr lang="zh-CN" altLang="en-US" b="1" dirty="0" smtClean="0">
+                <a:latin typeface="华文楷体" pitchFamily="2" charset="-122"/>
+                <a:ea typeface="华文楷体" pitchFamily="2" charset="-122"/>
+              </a:rPr>
+              <a:t>章  </a:t>
+            </a:r>
+            <a:r>
+              <a:rPr lang="en-US" altLang="zh-CN" b="1" dirty="0">
+                <a:latin typeface="华文楷体" pitchFamily="2" charset="-122"/>
+                <a:ea typeface="华文楷体" pitchFamily="2" charset="-122"/>
+              </a:rPr>
+              <a:t>C++</a:t>
+            </a:r>
+            <a:r>
+              <a:rPr lang="zh-CN" altLang="en-US" b="1" dirty="0">
+                <a:latin typeface="华文楷体" pitchFamily="2" charset="-122"/>
+                <a:ea typeface="华文楷体" pitchFamily="2" charset="-122"/>
+              </a:rPr>
+              <a:t>设计模式</a:t>
+            </a:r>
+            <a:endParaRPr lang="zh-CN" altLang="en-US" dirty="0"/>
+          </a:p>
+        </p:txBody>
+      </p:sp>
+      <p:sp>
+        <p:nvSpPr>
+          <p:cNvPr id="3" name="内容占位符 2"/>
+          <p:cNvSpPr>
+            <a:spLocks noGrp="1"/>
+          </p:cNvSpPr>
+          <p:nvPr>
+            <p:ph idx="1"/>
+          </p:nvPr>
+        </p:nvSpPr>
+        <p:spPr/>
+        <p:txBody>
+          <a:bodyPr/>
+          <a:lstStyle/>
+          <a:p>
+            <a:r>
+              <a:rPr lang="zh-CN" altLang="en-US" dirty="0"/>
+              <a:t>单例模式：如何实现和应用单例模式。</a:t>
+            </a:r>
+          </a:p>
+          <a:p>
+            <a:r>
+              <a:rPr lang="zh-CN" altLang="en-US" dirty="0"/>
+              <a:t>工厂模式：使用工厂模式来创建对象。</a:t>
+            </a:r>
+          </a:p>
+          <a:p>
+            <a:r>
+              <a:rPr lang="zh-CN" altLang="en-US" dirty="0"/>
+              <a:t>观察者模式：如何实现和应用观察者模式。</a:t>
+            </a:r>
+          </a:p>
+          <a:p>
+            <a:r>
+              <a:rPr lang="zh-CN" altLang="en-US" dirty="0"/>
+              <a:t>策略模式：定义一系列算法，将每一个算法封装起来</a:t>
+            </a:r>
+            <a:r>
+              <a:rPr lang="zh-CN" altLang="en-US" dirty="0" smtClean="0"/>
+              <a:t>。</a:t>
+            </a:r>
+            <a:endParaRPr lang="en-US" altLang="zh-CN" dirty="0" smtClean="0"/>
+          </a:p>
+          <a:p>
+            <a:r>
+              <a:rPr lang="zh-CN" altLang="en-US"/>
+              <a:t>高内</a:t>
+            </a:r>
+            <a:r>
+              <a:rPr lang="zh-CN" altLang="en-US" smtClean="0"/>
+              <a:t>聚，低耦合</a:t>
+            </a:r>
+            <a:endParaRPr lang="zh-CN" altLang="en-US" dirty="0"/>
+          </a:p>
+        </p:txBody>
+      </p:sp>
+    </p:spTree>
+    <p:extLst>
+      <p:ext uri="{BB962C8B-B14F-4D97-AF65-F5344CB8AC3E}">
+        <p14:creationId xmlns:p14="http://schemas.microsoft.com/office/powerpoint/2010/main" val="4116617042"/>
+      </p:ext>
+    </p:extLst>
+  </p:cSld>
+  <p:clrMapOvr>
+    <a:masterClrMapping/>
+  </p:clrMapOvr>
+  <p:timing>
+    <p:tnLst>
+      <p:par>
+        <p:cTn id="1" dur="indefinite" restart="never" nodeType="tmRoot"/>
+      </p:par>
+    </p:tnLst>
+  </p:timing>
+</p:sld>
+</file>
+
+<file path=ppt/slides/slide62.xml><?xml version="1.0" encoding="utf-8"?>
+<p:sld xmlns:a="http://schemas.openxmlformats.org/drawingml/2006/main" xmlns:r="http://schemas.openxmlformats.org/officeDocument/2006/relationships" xmlns:p="http://schemas.openxmlformats.org/presentationml/2006/main">
+  <p:cSld>
+    <p:spTree>
+      <p:nvGrpSpPr>
+        <p:cNvPr id="1" name=""/>
+        <p:cNvGrpSpPr/>
+        <p:nvPr/>
+      </p:nvGrpSpPr>
+      <p:grpSpPr>
+        <a:xfrm>
+          <a:off x="0" y="0"/>
+          <a:ext cx="0" cy="0"/>
+          <a:chOff x="0" y="0"/>
+          <a:chExt cx="0" cy="0"/>
+        </a:xfrm>
+      </p:grpSpPr>
+      <p:sp>
+        <p:nvSpPr>
+          <p:cNvPr id="2" name="标题 1"/>
+          <p:cNvSpPr>
+            <a:spLocks noGrp="1"/>
+          </p:cNvSpPr>
+          <p:nvPr>
+            <p:ph type="title"/>
+          </p:nvPr>
+        </p:nvSpPr>
+        <p:spPr/>
+        <p:txBody>
+          <a:bodyPr/>
+          <a:lstStyle/>
+          <a:p>
+            <a:r>
+              <a:rPr lang="zh-CN" altLang="en-US" b="1" dirty="0">
+                <a:latin typeface="华文楷体" pitchFamily="2" charset="-122"/>
+                <a:ea typeface="华文楷体" pitchFamily="2" charset="-122"/>
+              </a:rPr>
+              <a:t>第</a:t>
+            </a:r>
+            <a:r>
+              <a:rPr lang="en-US" altLang="zh-CN" b="1" dirty="0" smtClean="0">
+                <a:latin typeface="华文楷体" pitchFamily="2" charset="-122"/>
+                <a:ea typeface="华文楷体" pitchFamily="2" charset="-122"/>
+              </a:rPr>
+              <a:t>11</a:t>
+            </a:r>
+            <a:r>
+              <a:rPr lang="zh-CN" altLang="en-US" b="1" dirty="0" smtClean="0">
+                <a:latin typeface="华文楷体" pitchFamily="2" charset="-122"/>
+                <a:ea typeface="华文楷体" pitchFamily="2" charset="-122"/>
+              </a:rPr>
+              <a:t>章  </a:t>
+            </a:r>
+            <a:r>
+              <a:rPr lang="en-US" altLang="zh-CN" b="1" dirty="0">
+                <a:latin typeface="华文楷体" pitchFamily="2" charset="-122"/>
+                <a:ea typeface="华文楷体" pitchFamily="2" charset="-122"/>
+              </a:rPr>
+              <a:t>C++</a:t>
+            </a:r>
+            <a:r>
+              <a:rPr lang="zh-CN" altLang="en-US" b="1" dirty="0">
+                <a:latin typeface="华文楷体" pitchFamily="2" charset="-122"/>
+                <a:ea typeface="华文楷体" pitchFamily="2" charset="-122"/>
+              </a:rPr>
+              <a:t>进阶</a:t>
+            </a:r>
+            <a:endParaRPr lang="zh-CN" altLang="en-US" dirty="0"/>
+          </a:p>
+        </p:txBody>
+      </p:sp>
+      <p:sp>
+        <p:nvSpPr>
+          <p:cNvPr id="3" name="内容占位符 2"/>
+          <p:cNvSpPr>
+            <a:spLocks noGrp="1"/>
+          </p:cNvSpPr>
+          <p:nvPr>
+            <p:ph idx="1"/>
+          </p:nvPr>
+        </p:nvSpPr>
+        <p:spPr/>
+        <p:txBody>
+          <a:bodyPr/>
+          <a:lstStyle/>
+          <a:p>
+            <a:r>
+              <a:rPr lang="zh-CN" altLang="en-US" dirty="0"/>
+              <a:t>模板编程：函数模板、类模板、模板特化与偏特化、模板元编程。</a:t>
+            </a:r>
+          </a:p>
+          <a:p>
+            <a:r>
+              <a:rPr lang="en-US" altLang="zh-CN" dirty="0"/>
+              <a:t>C++</a:t>
+            </a:r>
+            <a:r>
+              <a:rPr lang="zh-CN" altLang="en-US" dirty="0"/>
+              <a:t>与</a:t>
+            </a:r>
+            <a:r>
+              <a:rPr lang="en-US" altLang="zh-CN" dirty="0"/>
+              <a:t>C</a:t>
+            </a:r>
+            <a:r>
+              <a:rPr lang="zh-CN" altLang="en-US" dirty="0"/>
+              <a:t>的互操作性：如何在</a:t>
+            </a:r>
+            <a:r>
+              <a:rPr lang="en-US" altLang="zh-CN" dirty="0"/>
+              <a:t>C++</a:t>
+            </a:r>
+            <a:r>
+              <a:rPr lang="zh-CN" altLang="en-US" dirty="0"/>
+              <a:t>中调用</a:t>
+            </a:r>
+            <a:r>
+              <a:rPr lang="en-US" altLang="zh-CN" dirty="0"/>
+              <a:t>C</a:t>
+            </a:r>
+            <a:r>
+              <a:rPr lang="zh-CN" altLang="en-US" dirty="0"/>
+              <a:t>语言代码。</a:t>
+            </a:r>
+          </a:p>
+          <a:p>
+            <a:r>
+              <a:rPr lang="en-US" altLang="zh-CN" dirty="0"/>
+              <a:t>C++</a:t>
+            </a:r>
+            <a:r>
+              <a:rPr lang="zh-CN" altLang="en-US" dirty="0"/>
+              <a:t>与外部库集成：使用外部库（如</a:t>
+            </a:r>
+            <a:r>
+              <a:rPr lang="en-US" altLang="zh-CN" dirty="0"/>
+              <a:t>Boost</a:t>
+            </a:r>
+            <a:r>
+              <a:rPr lang="zh-CN" altLang="en-US" dirty="0"/>
+              <a:t>、</a:t>
+            </a:r>
+            <a:r>
+              <a:rPr lang="en-US" altLang="zh-CN" dirty="0" err="1"/>
+              <a:t>Qt</a:t>
+            </a:r>
+            <a:r>
+              <a:rPr lang="zh-CN" altLang="en-US" dirty="0"/>
+              <a:t>、</a:t>
+            </a:r>
+            <a:r>
+              <a:rPr lang="en-US" altLang="zh-CN" dirty="0" err="1"/>
+              <a:t>OpenCV</a:t>
+            </a:r>
+            <a:r>
+              <a:rPr lang="zh-CN" altLang="en-US" dirty="0"/>
+              <a:t>等）进行开发。</a:t>
+            </a:r>
+          </a:p>
+        </p:txBody>
+      </p:sp>
+    </p:spTree>
+    <p:extLst>
+      <p:ext uri="{BB962C8B-B14F-4D97-AF65-F5344CB8AC3E}">
+        <p14:creationId xmlns:p14="http://schemas.microsoft.com/office/powerpoint/2010/main" val="2783617826"/>
+      </p:ext>
+    </p:extLst>
+  </p:cSld>
+  <p:clrMapOvr>
+    <a:masterClrMapping/>
+  </p:clrMapOvr>
+  <p:timing>
+    <p:tnLst>
+      <p:par>
+        <p:cTn id="1" dur="indefinite" restart="never" nodeType="tmRoot"/>
+      </p:par>
+    </p:tnLst>
+  </p:timing>
+</p:sld>
+</file>
+
+<file path=ppt/slides/slide63.xml><?xml version="1.0" encoding="utf-8"?>
+<p:sld xmlns:a="http://schemas.openxmlformats.org/drawingml/2006/main" xmlns:r="http://schemas.openxmlformats.org/officeDocument/2006/relationships" xmlns:p="http://schemas.openxmlformats.org/presentationml/2006/main">
+  <p:cSld>
+    <p:spTree>
+      <p:nvGrpSpPr>
+        <p:cNvPr id="1" name=""/>
+        <p:cNvGrpSpPr/>
+        <p:nvPr/>
+      </p:nvGrpSpPr>
+      <p:grpSpPr>
+        <a:xfrm>
+          <a:off x="0" y="0"/>
+          <a:ext cx="0" cy="0"/>
+          <a:chOff x="0" y="0"/>
+          <a:chExt cx="0" cy="0"/>
+        </a:xfrm>
+      </p:grpSpPr>
+      <p:sp>
+        <p:nvSpPr>
+          <p:cNvPr id="2" name="标题 1"/>
+          <p:cNvSpPr>
+            <a:spLocks noGrp="1"/>
+          </p:cNvSpPr>
+          <p:nvPr>
+            <p:ph type="title"/>
+          </p:nvPr>
+        </p:nvSpPr>
+        <p:spPr/>
+        <p:txBody>
+          <a:bodyPr/>
+          <a:lstStyle/>
+          <a:p>
+            <a:r>
+              <a:rPr lang="zh-CN" altLang="en-US" b="1" dirty="0">
+                <a:latin typeface="华文楷体" pitchFamily="2" charset="-122"/>
+                <a:ea typeface="华文楷体" pitchFamily="2" charset="-122"/>
+              </a:rPr>
+              <a:t>第</a:t>
+            </a:r>
+            <a:r>
+              <a:rPr lang="en-US" altLang="zh-CN" b="1" dirty="0" smtClean="0">
+                <a:latin typeface="华文楷体" pitchFamily="2" charset="-122"/>
+                <a:ea typeface="华文楷体" pitchFamily="2" charset="-122"/>
+              </a:rPr>
+              <a:t>12</a:t>
+            </a:r>
+            <a:r>
+              <a:rPr lang="zh-CN" altLang="en-US" b="1" smtClean="0">
+                <a:latin typeface="华文楷体" pitchFamily="2" charset="-122"/>
+                <a:ea typeface="华文楷体" pitchFamily="2" charset="-122"/>
+              </a:rPr>
+              <a:t>章  总和练习</a:t>
+            </a:r>
+            <a:endParaRPr lang="zh-CN" altLang="en-US" dirty="0"/>
+          </a:p>
+        </p:txBody>
+      </p:sp>
+      <p:sp>
+        <p:nvSpPr>
+          <p:cNvPr id="3" name="内容占位符 2"/>
+          <p:cNvSpPr>
+            <a:spLocks noGrp="1"/>
+          </p:cNvSpPr>
+          <p:nvPr>
+            <p:ph idx="1"/>
+          </p:nvPr>
+        </p:nvSpPr>
+        <p:spPr/>
+        <p:txBody>
+          <a:bodyPr/>
+          <a:lstStyle/>
+          <a:p>
+            <a:r>
+              <a:rPr lang="en-US" altLang="zh-CN" dirty="0"/>
+              <a:t>1.1 </a:t>
+            </a:r>
+            <a:r>
+              <a:rPr lang="zh-CN" altLang="en-US" dirty="0"/>
+              <a:t>什么是</a:t>
+            </a:r>
+            <a:r>
+              <a:rPr lang="zh-CN" altLang="en-US" dirty="0" smtClean="0"/>
+              <a:t>计算机程序</a:t>
+            </a:r>
+            <a:endParaRPr lang="zh-CN" altLang="en-US" dirty="0"/>
+          </a:p>
+        </p:txBody>
+      </p:sp>
+    </p:spTree>
+    <p:extLst>
+      <p:ext uri="{BB962C8B-B14F-4D97-AF65-F5344CB8AC3E}">
+        <p14:creationId xmlns:p14="http://schemas.microsoft.com/office/powerpoint/2010/main" val="1064233169"/>
       </p:ext>
     </p:extLst>
   </p:cSld>

</xml_diff>

<commit_message>
增加 - c5 demo
</commit_message>
<xml_diff>
--- a/learn_cpp/docs/C++语言培训.pptx
+++ b/learn_cpp/docs/C++语言培训.pptx
@@ -376,7 +376,7 @@
             <a:fld id="{B61BEF0D-F0BB-DE4B-95CE-6DB70DBA9567}" type="datetimeFigureOut">
               <a:rPr lang="en-US" dirty="0"/>
               <a:pPr/>
-              <a:t>3/17/2025</a:t>
+              <a:t>4/21/2025</a:t>
             </a:fld>
             <a:endParaRPr lang="en-US" dirty="0"/>
           </a:p>
@@ -711,7 +711,7 @@
             <a:fld id="{B61BEF0D-F0BB-DE4B-95CE-6DB70DBA9567}" type="datetimeFigureOut">
               <a:rPr lang="en-US" dirty="0"/>
               <a:pPr/>
-              <a:t>3/17/2025</a:t>
+              <a:t>4/21/2025</a:t>
             </a:fld>
             <a:endParaRPr lang="en-US" dirty="0"/>
           </a:p>
@@ -1109,7 +1109,7 @@
             <a:fld id="{B61BEF0D-F0BB-DE4B-95CE-6DB70DBA9567}" type="datetimeFigureOut">
               <a:rPr lang="en-US" dirty="0"/>
               <a:pPr/>
-              <a:t>3/17/2025</a:t>
+              <a:t>4/21/2025</a:t>
             </a:fld>
             <a:endParaRPr lang="en-US" dirty="0"/>
           </a:p>
@@ -1442,7 +1442,7 @@
             <a:fld id="{B61BEF0D-F0BB-DE4B-95CE-6DB70DBA9567}" type="datetimeFigureOut">
               <a:rPr lang="en-US" dirty="0"/>
               <a:pPr/>
-              <a:t>3/17/2025</a:t>
+              <a:t>4/21/2025</a:t>
             </a:fld>
             <a:endParaRPr lang="en-US" dirty="0"/>
           </a:p>
@@ -1759,7 +1759,7 @@
             <a:fld id="{B61BEF0D-F0BB-DE4B-95CE-6DB70DBA9567}" type="datetimeFigureOut">
               <a:rPr lang="en-US" dirty="0"/>
               <a:pPr/>
-              <a:t>3/17/2025</a:t>
+              <a:t>4/21/2025</a:t>
             </a:fld>
             <a:endParaRPr lang="en-US" dirty="0"/>
           </a:p>
@@ -2152,7 +2152,7 @@
             <a:fld id="{B61BEF0D-F0BB-DE4B-95CE-6DB70DBA9567}" type="datetimeFigureOut">
               <a:rPr lang="en-US" dirty="0"/>
               <a:pPr/>
-              <a:t>3/17/2025</a:t>
+              <a:t>4/21/2025</a:t>
             </a:fld>
             <a:endParaRPr lang="en-US" dirty="0"/>
           </a:p>
@@ -2406,7 +2406,7 @@
             <a:fld id="{B61BEF0D-F0BB-DE4B-95CE-6DB70DBA9567}" type="datetimeFigureOut">
               <a:rPr lang="en-US" dirty="0"/>
               <a:pPr/>
-              <a:t>3/17/2025</a:t>
+              <a:t>4/21/2025</a:t>
             </a:fld>
             <a:endParaRPr lang="en-US" dirty="0"/>
           </a:p>
@@ -2665,7 +2665,7 @@
             <a:fld id="{B61BEF0D-F0BB-DE4B-95CE-6DB70DBA9567}" type="datetimeFigureOut">
               <a:rPr lang="en-US" dirty="0"/>
               <a:pPr/>
-              <a:t>3/17/2025</a:t>
+              <a:t>4/21/2025</a:t>
             </a:fld>
             <a:endParaRPr lang="en-US" dirty="0"/>
           </a:p>
@@ -2924,7 +2924,7 @@
             <a:fld id="{B61BEF0D-F0BB-DE4B-95CE-6DB70DBA9567}" type="datetimeFigureOut">
               <a:rPr lang="en-US" dirty="0"/>
               <a:pPr/>
-              <a:t>3/17/2025</a:t>
+              <a:t>4/21/2025</a:t>
             </a:fld>
             <a:endParaRPr lang="en-US" dirty="0"/>
           </a:p>
@@ -3250,7 +3250,7 @@
             <a:fld id="{B61BEF0D-F0BB-DE4B-95CE-6DB70DBA9567}" type="datetimeFigureOut">
               <a:rPr lang="en-US" dirty="0"/>
               <a:pPr/>
-              <a:t>3/17/2025</a:t>
+              <a:t>4/21/2025</a:t>
             </a:fld>
             <a:endParaRPr lang="en-US" dirty="0"/>
           </a:p>
@@ -3570,7 +3570,7 @@
             <a:fld id="{B61BEF0D-F0BB-DE4B-95CE-6DB70DBA9567}" type="datetimeFigureOut">
               <a:rPr lang="en-US" dirty="0"/>
               <a:pPr/>
-              <a:t>3/17/2025</a:t>
+              <a:t>4/21/2025</a:t>
             </a:fld>
             <a:endParaRPr lang="en-US" dirty="0"/>
           </a:p>
@@ -4053,7 +4053,7 @@
             <a:fld id="{B61BEF0D-F0BB-DE4B-95CE-6DB70DBA9567}" type="datetimeFigureOut">
               <a:rPr lang="en-US" dirty="0"/>
               <a:pPr/>
-              <a:t>3/17/2025</a:t>
+              <a:t>4/21/2025</a:t>
             </a:fld>
             <a:endParaRPr lang="en-US" dirty="0"/>
           </a:p>
@@ -4255,7 +4255,7 @@
             <a:fld id="{B61BEF0D-F0BB-DE4B-95CE-6DB70DBA9567}" type="datetimeFigureOut">
               <a:rPr lang="en-US" dirty="0"/>
               <a:pPr/>
-              <a:t>3/17/2025</a:t>
+              <a:t>4/21/2025</a:t>
             </a:fld>
             <a:endParaRPr lang="en-US" dirty="0"/>
           </a:p>
@@ -4429,7 +4429,7 @@
             <a:fld id="{B61BEF0D-F0BB-DE4B-95CE-6DB70DBA9567}" type="datetimeFigureOut">
               <a:rPr lang="en-US" dirty="0"/>
               <a:pPr/>
-              <a:t>3/17/2025</a:t>
+              <a:t>4/21/2025</a:t>
             </a:fld>
             <a:endParaRPr lang="en-US" dirty="0"/>
           </a:p>
@@ -4759,7 +4759,7 @@
             <a:fld id="{B61BEF0D-F0BB-DE4B-95CE-6DB70DBA9567}" type="datetimeFigureOut">
               <a:rPr lang="en-US" dirty="0"/>
               <a:pPr/>
-              <a:t>3/17/2025</a:t>
+              <a:t>4/21/2025</a:t>
             </a:fld>
             <a:endParaRPr lang="en-US" dirty="0"/>
           </a:p>
@@ -5101,7 +5101,7 @@
             <a:fld id="{B61BEF0D-F0BB-DE4B-95CE-6DB70DBA9567}" type="datetimeFigureOut">
               <a:rPr lang="en-US" dirty="0"/>
               <a:pPr/>
-              <a:t>3/17/2025</a:t>
+              <a:t>4/21/2025</a:t>
             </a:fld>
             <a:endParaRPr lang="en-US" dirty="0"/>
           </a:p>
@@ -7215,7 +7215,7 @@
             <a:fld id="{B61BEF0D-F0BB-DE4B-95CE-6DB70DBA9567}" type="datetimeFigureOut">
               <a:rPr lang="en-US" dirty="0"/>
               <a:pPr/>
-              <a:t>3/17/2025</a:t>
+              <a:t>4/21/2025</a:t>
             </a:fld>
             <a:endParaRPr lang="en-US" dirty="0"/>
           </a:p>
@@ -21231,7 +21231,18 @@
           <a:p>
             <a:r>
               <a:rPr lang="zh-CN" altLang="en-US" dirty="0"/>
-              <a:t>类与对象：定义类、创建对象、构造函数与析构函数。</a:t>
+              <a:t>为什么使用面向对象</a:t>
+            </a:r>
+            <a:endParaRPr lang="en-US" altLang="zh-CN" dirty="0" smtClean="0"/>
+          </a:p>
+          <a:p>
+            <a:r>
+              <a:rPr lang="zh-CN" altLang="en-US" dirty="0" smtClean="0"/>
+              <a:t>类</a:t>
+            </a:r>
+            <a:r>
+              <a:rPr lang="zh-CN" altLang="en-US" dirty="0"/>
+              <a:t>与对象：定义类、创建对象、构造函数与析构函数。</a:t>
             </a:r>
           </a:p>
           <a:p>
@@ -21710,7 +21721,9 @@
         </p:nvSpPr>
         <p:spPr/>
         <p:txBody>
-          <a:bodyPr/>
+          <a:bodyPr>
+            <a:normAutofit lnSpcReduction="10000"/>
+          </a:bodyPr>
           <a:lstStyle/>
           <a:p>
             <a:r>
@@ -21731,8 +21744,15 @@
             </a:r>
           </a:p>
           <a:p>
-            <a:r>
-              <a:rPr lang="zh-CN" altLang="en-US" dirty="0"/>
+            <a:pPr marL="0" indent="0">
+              <a:buNone/>
+            </a:pPr>
+            <a:r>
+              <a:rPr lang="en-US" altLang="zh-CN" dirty="0" smtClean="0"/>
+              <a:t>	</a:t>
+            </a:r>
+            <a:r>
+              <a:rPr lang="zh-CN" altLang="en-US" dirty="0" smtClean="0"/>
               <a:t>在</a:t>
             </a:r>
             <a:r>
@@ -21741,10 +21761,157 @@
             </a:r>
             <a:r>
               <a:rPr lang="zh-CN" altLang="en-US" dirty="0"/>
-              <a:t>语言中，我们通过函数来操作数据结构中的数据。每个函数都只能操作通过参数传递的变量。虽然可以通过结构体组织数据，但没有像类那样的封装性和继承性。</a:t>
-            </a:r>
-          </a:p>
-          <a:p>
+              <a:t>语言中，我们通过函数来操作数据结构中的数据。每个函数都只能操作通过</a:t>
+            </a:r>
+            <a:r>
+              <a:rPr lang="zh-CN" altLang="en-US" dirty="0" smtClean="0"/>
+              <a:t>参</a:t>
+            </a:r>
+            <a:r>
+              <a:rPr lang="en-US" altLang="zh-CN" dirty="0" smtClean="0"/>
+              <a:t>	</a:t>
+            </a:r>
+            <a:r>
+              <a:rPr lang="zh-CN" altLang="en-US" dirty="0" smtClean="0"/>
+              <a:t>数</a:t>
+            </a:r>
+            <a:r>
+              <a:rPr lang="zh-CN" altLang="en-US" dirty="0"/>
+              <a:t>传递的变量。虽然可以通过结构体组织数据，但没有像类那样的封装性和继承性</a:t>
+            </a:r>
+            <a:r>
+              <a:rPr lang="zh-CN" altLang="en-US" dirty="0" smtClean="0"/>
+              <a:t>。</a:t>
+            </a:r>
+            <a:endParaRPr lang="en-US" altLang="zh-CN" dirty="0" smtClean="0"/>
+          </a:p>
+          <a:p>
+            <a:r>
+              <a:rPr lang="en-US" altLang="zh-CN" dirty="0"/>
+              <a:t>C </a:t>
+            </a:r>
+            <a:r>
+              <a:rPr lang="zh-CN" altLang="en-US" dirty="0"/>
+              <a:t>语言中的代码</a:t>
+            </a:r>
+            <a:r>
+              <a:rPr lang="zh-CN" altLang="en-US" dirty="0" smtClean="0"/>
+              <a:t>组织</a:t>
+            </a:r>
+            <a:endParaRPr lang="en-US" altLang="zh-CN" dirty="0" smtClean="0"/>
+          </a:p>
+          <a:p>
+            <a:pPr marL="0" indent="0">
+              <a:buNone/>
+            </a:pPr>
+            <a:r>
+              <a:rPr lang="en-US" altLang="zh-CN" dirty="0"/>
+              <a:t>	</a:t>
+            </a:r>
+            <a:r>
+              <a:rPr lang="zh-CN" altLang="en-US" dirty="0"/>
+              <a:t>在 </a:t>
+            </a:r>
+            <a:r>
+              <a:rPr lang="en-US" altLang="zh-CN" dirty="0"/>
+              <a:t>C </a:t>
+            </a:r>
+            <a:r>
+              <a:rPr lang="zh-CN" altLang="en-US" dirty="0"/>
+              <a:t>语言中，我们通常使用结构体来模拟对象的功能，但结构体只是数据的集合</a:t>
+            </a:r>
+            <a:r>
+              <a:rPr lang="zh-CN" altLang="en-US" dirty="0" smtClean="0"/>
+              <a:t>，</a:t>
+            </a:r>
+            <a:endParaRPr lang="en-US" altLang="zh-CN" dirty="0" smtClean="0"/>
+          </a:p>
+          <a:p>
+            <a:pPr marL="0" indent="0">
+              <a:buNone/>
+            </a:pPr>
+            <a:r>
+              <a:rPr lang="en-US" altLang="zh-CN" dirty="0"/>
+              <a:t>	</a:t>
+            </a:r>
+            <a:r>
+              <a:rPr lang="zh-CN" altLang="en-US" dirty="0" smtClean="0"/>
+              <a:t>不能</a:t>
+            </a:r>
+            <a:r>
+              <a:rPr lang="zh-CN" altLang="en-US" dirty="0"/>
+              <a:t>直接包含操作数据的方法。</a:t>
+            </a:r>
+            <a:endParaRPr lang="en-US" altLang="zh-CN" dirty="0" smtClean="0"/>
+          </a:p>
+          <a:p>
+            <a:r>
+              <a:rPr lang="en-US" altLang="zh-CN" dirty="0"/>
+              <a:t>C++ </a:t>
+            </a:r>
+            <a:r>
+              <a:rPr lang="zh-CN" altLang="en-US" dirty="0"/>
+              <a:t>中的类与对象</a:t>
+            </a:r>
+            <a:endParaRPr lang="zh-CN" altLang="en-US" dirty="0"/>
+          </a:p>
+          <a:p>
+            <a:pPr marL="0" indent="0">
+              <a:buNone/>
+            </a:pPr>
+            <a:r>
+              <a:rPr lang="en-US" altLang="zh-CN" dirty="0" smtClean="0"/>
+              <a:t>	</a:t>
+            </a:r>
+            <a:r>
+              <a:rPr lang="zh-CN" altLang="en-US" dirty="0"/>
+              <a:t>在 </a:t>
+            </a:r>
+            <a:r>
+              <a:rPr lang="en-US" altLang="zh-CN" dirty="0"/>
+              <a:t>C++ </a:t>
+            </a:r>
+            <a:r>
+              <a:rPr lang="zh-CN" altLang="en-US" dirty="0"/>
+              <a:t>中，类不仅包含数据（成员变量），还可以包含操作数据的方法（成员</a:t>
+            </a:r>
+            <a:r>
+              <a:rPr lang="zh-CN" altLang="en-US" dirty="0" smtClean="0"/>
+              <a:t>函</a:t>
+            </a:r>
+            <a:r>
+              <a:rPr lang="en-US" altLang="zh-CN" dirty="0" smtClean="0"/>
+              <a:t>	</a:t>
+            </a:r>
+            <a:r>
+              <a:rPr lang="zh-CN" altLang="en-US" dirty="0" smtClean="0"/>
+              <a:t>数</a:t>
+            </a:r>
+            <a:r>
+              <a:rPr lang="zh-CN" altLang="en-US" dirty="0"/>
+              <a:t>）。数据和操作数据的功能被封装在同一个地方，增强了代码的结构性和可</a:t>
+            </a:r>
+            <a:r>
+              <a:rPr lang="zh-CN" altLang="en-US" dirty="0" smtClean="0"/>
+              <a:t>维护</a:t>
+            </a:r>
+            <a:r>
+              <a:rPr lang="en-US" altLang="zh-CN" dirty="0" smtClean="0"/>
+              <a:t>	</a:t>
+            </a:r>
+            <a:r>
+              <a:rPr lang="zh-CN" altLang="en-US" dirty="0" smtClean="0"/>
+              <a:t>性</a:t>
+            </a:r>
+            <a:r>
+              <a:rPr lang="zh-CN" altLang="en-US" dirty="0"/>
+              <a:t>。</a:t>
+            </a:r>
+          </a:p>
+          <a:p>
+            <a:pPr marL="0" indent="0">
+              <a:buNone/>
+            </a:pPr>
             <a:endParaRPr lang="zh-CN" altLang="en-US" dirty="0"/>
           </a:p>
         </p:txBody>
@@ -22393,7 +22560,7 @@
           <a:p>
             <a:r>
               <a:rPr lang="en-US" altLang="zh-CN" dirty="0" smtClean="0"/>
-              <a:t>5.2 </a:t>
+              <a:t>5.3 </a:t>
             </a:r>
             <a:r>
               <a:rPr lang="zh-CN" altLang="en-US" dirty="0"/>
@@ -22539,7 +22706,7 @@
           <a:p>
             <a:r>
               <a:rPr lang="en-US" altLang="zh-CN" dirty="0" smtClean="0"/>
-              <a:t>5.3 </a:t>
+              <a:t>5.4 </a:t>
             </a:r>
             <a:r>
               <a:rPr lang="zh-CN" altLang="en-US" dirty="0"/>
@@ -22683,7 +22850,7 @@
           <a:p>
             <a:r>
               <a:rPr lang="en-US" altLang="zh-CN" dirty="0" smtClean="0"/>
-              <a:t>5.4 </a:t>
+              <a:t>5.5 </a:t>
             </a:r>
             <a:r>
               <a:rPr lang="zh-CN" altLang="en-US" dirty="0"/>

</xml_diff>